<commit_message>
Update Regular Expressions in SQL.pptx
</commit_message>
<xml_diff>
--- a/Brainstorm/Regular Expressions in SQL.pptx
+++ b/Brainstorm/Regular Expressions in SQL.pptx
@@ -6,11 +6,8 @@
   </p:sldMasterIdLst>
   <p:sldIdLst>
     <p:sldId id="256" r:id="rId2"/>
-    <p:sldId id="258" r:id="rId3"/>
-    <p:sldId id="259" r:id="rId4"/>
-    <p:sldId id="260" r:id="rId5"/>
-    <p:sldId id="261" r:id="rId6"/>
-    <p:sldId id="257" r:id="rId7"/>
+    <p:sldId id="262" r:id="rId3"/>
+    <p:sldId id="257" r:id="rId4"/>
   </p:sldIdLst>
   <p:sldSz cx="12192000" cy="6858000"/>
   <p:notesSz cx="6858000" cy="9144000"/>
@@ -3602,6 +3599,11 @@
             <a:pPr algn="l"/>
             <a:r>
               <a:rPr lang="en-US" sz="1800" dirty="0">
+                <a:solidFill>
+                  <a:schemeClr val="bg1">
+                    <a:lumMod val="50000"/>
+                  </a:schemeClr>
+                </a:solidFill>
                 <a:latin typeface="Poppins" panose="00000500000000000000" pitchFamily="2" charset="0"/>
                 <a:cs typeface="Poppins" panose="00000500000000000000" pitchFamily="2" charset="0"/>
               </a:rPr>
@@ -3694,33 +3696,80 @@
           <a:chExt cx="0" cy="0"/>
         </a:xfrm>
       </p:grpSpPr>
-      <p:sp>
-        <p:nvSpPr>
-          <p:cNvPr id="24" name="Rectangle 23">
-            <a:extLst>
-              <a:ext uri="{FF2B5EF4-FFF2-40B4-BE49-F238E27FC236}">
-                <a16:creationId xmlns:a16="http://schemas.microsoft.com/office/drawing/2014/main" id="{2A79EE62-7157-8B02-FC85-69F0BEBD8897}"/>
-              </a:ext>
-            </a:extLst>
-          </p:cNvPr>
-          <p:cNvSpPr/>
+      <p:pic>
+        <p:nvPicPr>
+          <p:cNvPr id="2050" name="Picture 2" descr="people sitting down near table with assorted laptop computers">
+            <a:extLst>
+              <a:ext uri="{FF2B5EF4-FFF2-40B4-BE49-F238E27FC236}">
+                <a16:creationId xmlns:a16="http://schemas.microsoft.com/office/drawing/2014/main" id="{D60012E0-1EBB-7A62-110A-04EBFC54B4D9}"/>
+              </a:ext>
+            </a:extLst>
+          </p:cNvPr>
+          <p:cNvPicPr>
+            <a:picLocks noChangeAspect="1" noChangeArrowheads="1"/>
+          </p:cNvPicPr>
           <p:nvPr/>
+        </p:nvPicPr>
+        <p:blipFill rotWithShape="1">
+          <a:blip r:embed="rId2">
+            <a:extLst>
+              <a:ext uri="{28A0092B-C50C-407E-A947-70E740481C1C}">
+                <a14:useLocalDpi xmlns:a14="http://schemas.microsoft.com/office/drawing/2010/main" val="0"/>
+              </a:ext>
+            </a:extLst>
+          </a:blip>
+          <a:srcRect b="57834"/>
+          <a:stretch/>
+        </p:blipFill>
+        <p:spPr bwMode="auto">
+          <a:xfrm>
+            <a:off x="0" y="0"/>
+            <a:ext cx="12192000" cy="3429000"/>
+          </a:xfrm>
+          <a:prstGeom prst="rect">
+            <a:avLst/>
+          </a:prstGeom>
+          <a:noFill/>
+          <a:extLst>
+            <a:ext uri="{909E8E84-426E-40DD-AFC4-6F175D3DCCD1}">
+              <a14:hiddenFill xmlns:a14="http://schemas.microsoft.com/office/drawing/2010/main">
+                <a:solidFill>
+                  <a:srgbClr val="FFFFFF"/>
+                </a:solidFill>
+              </a14:hiddenFill>
+            </a:ext>
+          </a:extLst>
+        </p:spPr>
+      </p:pic>
+      <p:sp>
+        <p:nvSpPr>
+          <p:cNvPr id="2" name="Rectangle 1">
+            <a:extLst>
+              <a:ext uri="{FF2B5EF4-FFF2-40B4-BE49-F238E27FC236}">
+                <a16:creationId xmlns:a16="http://schemas.microsoft.com/office/drawing/2014/main" id="{9F7A12BD-9492-6FEA-ECF9-C027E25DF17F}"/>
+              </a:ext>
+            </a:extLst>
+          </p:cNvPr>
+          <p:cNvSpPr>
+            <a:spLocks noGrp="1" noRot="1" noMove="1" noResize="1" noEditPoints="1" noAdjustHandles="1" noChangeArrowheads="1" noChangeShapeType="1"/>
+          </p:cNvSpPr>
+          <p:nvPr/>
         </p:nvSpPr>
         <p:spPr>
-          <a:xfrm rot="16200000" flipH="1">
-            <a:off x="3229745" y="2843797"/>
-            <a:ext cx="6880458" cy="1147948"/>
+          <a:xfrm>
+            <a:off x="0" y="0"/>
+            <a:ext cx="12192000" cy="3429000"/>
           </a:xfrm>
           <a:prstGeom prst="rect">
             <a:avLst/>
           </a:prstGeom>
           <a:solidFill>
-            <a:srgbClr val="DB4437"/>
+            <a:srgbClr val="000000">
+              <a:alpha val="50196"/>
+            </a:srgbClr>
           </a:solidFill>
           <a:ln>
-            <a:solidFill>
-              <a:srgbClr val="DB4437"/>
-            </a:solidFill>
+            <a:noFill/>
           </a:ln>
         </p:spPr>
         <p:style>
@@ -3750,10 +3799,10 @@
       </p:sp>
       <p:sp>
         <p:nvSpPr>
-          <p:cNvPr id="5" name="Title 1">
-            <a:extLst>
-              <a:ext uri="{FF2B5EF4-FFF2-40B4-BE49-F238E27FC236}">
-                <a16:creationId xmlns:a16="http://schemas.microsoft.com/office/drawing/2014/main" id="{04B84D17-BAAC-ADA2-4844-1DBC666F0FD1}"/>
+          <p:cNvPr id="8" name="Title 1">
+            <a:extLst>
+              <a:ext uri="{FF2B5EF4-FFF2-40B4-BE49-F238E27FC236}">
+                <a16:creationId xmlns:a16="http://schemas.microsoft.com/office/drawing/2014/main" id="{9A71E735-7D51-CA31-9B13-51D2CCBBED3D}"/>
               </a:ext>
             </a:extLst>
           </p:cNvPr>
@@ -3764,8 +3813,8 @@
         </p:nvSpPr>
         <p:spPr>
           <a:xfrm>
-            <a:off x="7787297" y="1031076"/>
-            <a:ext cx="2929139" cy="793668"/>
+            <a:off x="745230" y="4138633"/>
+            <a:ext cx="2929139" cy="649267"/>
           </a:xfrm>
           <a:prstGeom prst="rect">
             <a:avLst/>
@@ -3795,7 +3844,6 @@
             </a:lvl1pPr>
           </a:lstStyle>
           <a:p>
-            <a:pPr algn="l"/>
             <a:r>
               <a:rPr lang="en-US" sz="2400" dirty="0">
                 <a:latin typeface="Poppins Medium" panose="00000600000000000000" pitchFamily="2" charset="0"/>
@@ -3808,323 +3856,48 @@
       </p:sp>
       <p:sp>
         <p:nvSpPr>
-          <p:cNvPr id="8" name="Title 1">
-            <a:extLst>
-              <a:ext uri="{FF2B5EF4-FFF2-40B4-BE49-F238E27FC236}">
-                <a16:creationId xmlns:a16="http://schemas.microsoft.com/office/drawing/2014/main" id="{9A71E735-7D51-CA31-9B13-51D2CCBBED3D}"/>
-              </a:ext>
-            </a:extLst>
-          </p:cNvPr>
-          <p:cNvSpPr txBox="1">
-            <a:spLocks/>
-          </p:cNvSpPr>
+          <p:cNvPr id="3" name="Oval 2">
+            <a:extLst>
+              <a:ext uri="{FF2B5EF4-FFF2-40B4-BE49-F238E27FC236}">
+                <a16:creationId xmlns:a16="http://schemas.microsoft.com/office/drawing/2014/main" id="{7A497583-097F-E5C6-205E-3A9907FEEFB3}"/>
+              </a:ext>
+            </a:extLst>
+          </p:cNvPr>
+          <p:cNvSpPr/>
           <p:nvPr/>
         </p:nvSpPr>
         <p:spPr>
           <a:xfrm>
-            <a:off x="7787296" y="3049432"/>
-            <a:ext cx="2929139" cy="742754"/>
+            <a:off x="1562100" y="2782732"/>
+            <a:ext cx="1244600" cy="1244600"/>
           </a:xfrm>
-          <a:prstGeom prst="rect">
-            <a:avLst/>
-          </a:prstGeom>
-        </p:spPr>
-        <p:txBody>
-          <a:bodyPr vert="horz" lIns="91440" tIns="45720" rIns="91440" bIns="45720" rtlCol="0" anchor="ctr">
-            <a:normAutofit/>
-          </a:bodyPr>
-          <a:lstStyle>
-            <a:lvl1pPr algn="ctr" defTabSz="914400" rtl="0" eaLnBrk="1" latinLnBrk="0" hangingPunct="1">
-              <a:lnSpc>
-                <a:spcPct val="90000"/>
-              </a:lnSpc>
-              <a:spcBef>
-                <a:spcPct val="0"/>
-              </a:spcBef>
-              <a:buNone/>
-              <a:defRPr sz="6000" kern="1200">
-                <a:solidFill>
-                  <a:schemeClr val="tx1"/>
-                </a:solidFill>
-                <a:latin typeface="+mj-lt"/>
-                <a:ea typeface="+mj-ea"/>
-                <a:cs typeface="+mj-cs"/>
-              </a:defRPr>
-            </a:lvl1pPr>
-          </a:lstStyle>
-          <a:p>
-            <a:pPr algn="l"/>
-            <a:r>
-              <a:rPr lang="en-US" sz="2400" dirty="0">
-                <a:latin typeface="Poppins Medium" panose="00000600000000000000" pitchFamily="2" charset="0"/>
-                <a:cs typeface="Poppins Medium" panose="00000600000000000000" pitchFamily="2" charset="0"/>
-              </a:rPr>
-              <a:t>Use Case</a:t>
-            </a:r>
-          </a:p>
-        </p:txBody>
-      </p:sp>
-      <p:sp>
-        <p:nvSpPr>
-          <p:cNvPr id="10" name="Title 1">
-            <a:extLst>
-              <a:ext uri="{FF2B5EF4-FFF2-40B4-BE49-F238E27FC236}">
-                <a16:creationId xmlns:a16="http://schemas.microsoft.com/office/drawing/2014/main" id="{E126F713-CEAA-09B1-CEF6-A5C8D8BAB0C6}"/>
-              </a:ext>
-            </a:extLst>
-          </p:cNvPr>
-          <p:cNvSpPr txBox="1">
-            <a:spLocks/>
-          </p:cNvSpPr>
-          <p:nvPr/>
-        </p:nvSpPr>
-        <p:spPr>
-          <a:xfrm>
-            <a:off x="7787298" y="5036122"/>
-            <a:ext cx="2929139" cy="750670"/>
-          </a:xfrm>
-          <a:prstGeom prst="rect">
-            <a:avLst/>
-          </a:prstGeom>
-        </p:spPr>
-        <p:txBody>
-          <a:bodyPr vert="horz" lIns="91440" tIns="45720" rIns="91440" bIns="45720" rtlCol="0" anchor="ctr">
-            <a:normAutofit/>
-          </a:bodyPr>
-          <a:lstStyle>
-            <a:lvl1pPr algn="ctr" defTabSz="914400" rtl="0" eaLnBrk="1" latinLnBrk="0" hangingPunct="1">
-              <a:lnSpc>
-                <a:spcPct val="90000"/>
-              </a:lnSpc>
-              <a:spcBef>
-                <a:spcPct val="0"/>
-              </a:spcBef>
-              <a:buNone/>
-              <a:defRPr sz="6000" kern="1200">
-                <a:solidFill>
-                  <a:schemeClr val="tx1"/>
-                </a:solidFill>
-                <a:latin typeface="+mj-lt"/>
-                <a:ea typeface="+mj-ea"/>
-                <a:cs typeface="+mj-cs"/>
-              </a:defRPr>
-            </a:lvl1pPr>
-          </a:lstStyle>
-          <a:p>
-            <a:pPr algn="l"/>
-            <a:r>
-              <a:rPr lang="en-US" sz="2400" dirty="0">
-                <a:latin typeface="Poppins Medium" panose="00000600000000000000" pitchFamily="2" charset="0"/>
-                <a:cs typeface="Poppins Medium" panose="00000600000000000000" pitchFamily="2" charset="0"/>
-              </a:rPr>
-              <a:t>Case Study</a:t>
-            </a:r>
-          </a:p>
-        </p:txBody>
-      </p:sp>
-      <p:sp>
-        <p:nvSpPr>
-          <p:cNvPr id="12" name="Title 1">
-            <a:extLst>
-              <a:ext uri="{FF2B5EF4-FFF2-40B4-BE49-F238E27FC236}">
-                <a16:creationId xmlns:a16="http://schemas.microsoft.com/office/drawing/2014/main" id="{8A2E8E83-5D9B-B0FA-6522-2202C6218135}"/>
-              </a:ext>
-            </a:extLst>
-          </p:cNvPr>
-          <p:cNvSpPr txBox="1">
-            <a:spLocks/>
-          </p:cNvSpPr>
-          <p:nvPr/>
-        </p:nvSpPr>
-        <p:spPr>
-          <a:xfrm>
-            <a:off x="1097585" y="2630606"/>
-            <a:ext cx="2990496" cy="1596788"/>
-          </a:xfrm>
-          <a:prstGeom prst="rect">
-            <a:avLst/>
-          </a:prstGeom>
-        </p:spPr>
-        <p:txBody>
-          <a:bodyPr vert="horz" lIns="91440" tIns="45720" rIns="91440" bIns="45720" rtlCol="0" anchor="ctr">
-            <a:normAutofit/>
-          </a:bodyPr>
-          <a:lstStyle>
-            <a:lvl1pPr algn="ctr" defTabSz="914400" rtl="0" eaLnBrk="1" latinLnBrk="0" hangingPunct="1">
-              <a:lnSpc>
-                <a:spcPct val="90000"/>
-              </a:lnSpc>
-              <a:spcBef>
-                <a:spcPct val="0"/>
-              </a:spcBef>
-              <a:buNone/>
-              <a:defRPr sz="6000" kern="1200">
-                <a:solidFill>
-                  <a:schemeClr val="tx1"/>
-                </a:solidFill>
-                <a:latin typeface="+mj-lt"/>
-                <a:ea typeface="+mj-ea"/>
-                <a:cs typeface="+mj-cs"/>
-              </a:defRPr>
-            </a:lvl1pPr>
-          </a:lstStyle>
-          <a:p>
-            <a:pPr algn="l"/>
-            <a:r>
-              <a:rPr lang="en-US" sz="4800" dirty="0">
-                <a:latin typeface="Poppins Medium" panose="00000600000000000000" pitchFamily="2" charset="0"/>
-                <a:cs typeface="Poppins Medium" panose="00000600000000000000" pitchFamily="2" charset="0"/>
-              </a:rPr>
-              <a:t>Table of Contents</a:t>
-            </a:r>
-          </a:p>
-        </p:txBody>
-      </p:sp>
-      <p:pic>
-        <p:nvPicPr>
-          <p:cNvPr id="14" name="Graphic 13" descr="Lights On with solid fill">
-            <a:extLst>
-              <a:ext uri="{FF2B5EF4-FFF2-40B4-BE49-F238E27FC236}">
-                <a16:creationId xmlns:a16="http://schemas.microsoft.com/office/drawing/2014/main" id="{42C7C49D-1E61-EF8F-9D8D-95563035FF6A}"/>
-              </a:ext>
-            </a:extLst>
-          </p:cNvPr>
-          <p:cNvPicPr>
-            <a:picLocks noChangeAspect="1"/>
-          </p:cNvPicPr>
-          <p:nvPr/>
-        </p:nvPicPr>
-        <p:blipFill>
-          <a:blip r:embed="rId2">
-            <a:extLst>
-              <a:ext uri="{28A0092B-C50C-407E-A947-70E740481C1C}">
-                <a14:useLocalDpi xmlns:a14="http://schemas.microsoft.com/office/drawing/2010/main" val="0"/>
-              </a:ext>
-              <a:ext uri="{96DAC541-7B7A-43D3-8B79-37D633B846F1}">
-                <asvg:svgBlip xmlns:asvg="http://schemas.microsoft.com/office/drawing/2016/SVG/main" r:embed="rId3"/>
-              </a:ext>
-            </a:extLst>
-          </a:blip>
-          <a:stretch>
-            <a:fillRect/>
-          </a:stretch>
-        </p:blipFill>
-        <p:spPr>
-          <a:xfrm>
-            <a:off x="6273140" y="1031076"/>
-            <a:ext cx="793668" cy="793668"/>
-          </a:xfrm>
-          <a:prstGeom prst="rect">
-            <a:avLst/>
-          </a:prstGeom>
-        </p:spPr>
-      </p:pic>
-      <p:pic>
-        <p:nvPicPr>
-          <p:cNvPr id="16" name="Graphic 15" descr="Bullseye with solid fill">
-            <a:extLst>
-              <a:ext uri="{FF2B5EF4-FFF2-40B4-BE49-F238E27FC236}">
-                <a16:creationId xmlns:a16="http://schemas.microsoft.com/office/drawing/2014/main" id="{812E2CD3-219E-38D5-24F7-D2D765F2A364}"/>
-              </a:ext>
-            </a:extLst>
-          </p:cNvPr>
-          <p:cNvPicPr>
-            <a:picLocks noChangeAspect="1"/>
-          </p:cNvPicPr>
-          <p:nvPr/>
-        </p:nvPicPr>
-        <p:blipFill>
-          <a:blip r:embed="rId4">
-            <a:extLst>
-              <a:ext uri="{28A0092B-C50C-407E-A947-70E740481C1C}">
-                <a14:useLocalDpi xmlns:a14="http://schemas.microsoft.com/office/drawing/2010/main" val="0"/>
-              </a:ext>
-              <a:ext uri="{96DAC541-7B7A-43D3-8B79-37D633B846F1}">
-                <asvg:svgBlip xmlns:asvg="http://schemas.microsoft.com/office/drawing/2016/SVG/main" r:embed="rId5"/>
-              </a:ext>
-            </a:extLst>
-          </a:blip>
-          <a:stretch>
-            <a:fillRect/>
-          </a:stretch>
-        </p:blipFill>
-        <p:spPr>
-          <a:xfrm>
-            <a:off x="6273140" y="3012100"/>
-            <a:ext cx="793668" cy="793668"/>
-          </a:xfrm>
-          <a:prstGeom prst="rect">
-            <a:avLst/>
-          </a:prstGeom>
-        </p:spPr>
-      </p:pic>
-      <p:pic>
-        <p:nvPicPr>
-          <p:cNvPr id="18" name="Graphic 17" descr="Clipboard with solid fill">
-            <a:extLst>
-              <a:ext uri="{FF2B5EF4-FFF2-40B4-BE49-F238E27FC236}">
-                <a16:creationId xmlns:a16="http://schemas.microsoft.com/office/drawing/2014/main" id="{A3C48E83-2B28-B7BC-2369-9850479D9A69}"/>
-              </a:ext>
-            </a:extLst>
-          </p:cNvPr>
-          <p:cNvPicPr>
-            <a:picLocks noChangeAspect="1"/>
-          </p:cNvPicPr>
-          <p:nvPr/>
-        </p:nvPicPr>
-        <p:blipFill>
-          <a:blip r:embed="rId6">
-            <a:extLst>
-              <a:ext uri="{28A0092B-C50C-407E-A947-70E740481C1C}">
-                <a14:useLocalDpi xmlns:a14="http://schemas.microsoft.com/office/drawing/2010/main" val="0"/>
-              </a:ext>
-              <a:ext uri="{96DAC541-7B7A-43D3-8B79-37D633B846F1}">
-                <asvg:svgBlip xmlns:asvg="http://schemas.microsoft.com/office/drawing/2016/SVG/main" r:embed="rId7"/>
-              </a:ext>
-            </a:extLst>
-          </a:blip>
-          <a:stretch>
-            <a:fillRect/>
-          </a:stretch>
-        </p:blipFill>
-        <p:spPr>
-          <a:xfrm>
-            <a:off x="6273140" y="4993124"/>
-            <a:ext cx="793668" cy="793668"/>
-          </a:xfrm>
-          <a:prstGeom prst="rect">
-            <a:avLst/>
-          </a:prstGeom>
-        </p:spPr>
-      </p:pic>
-      <p:sp>
-        <p:nvSpPr>
-          <p:cNvPr id="19" name="Rectangle 18">
-            <a:extLst>
-              <a:ext uri="{FF2B5EF4-FFF2-40B4-BE49-F238E27FC236}">
-                <a16:creationId xmlns:a16="http://schemas.microsoft.com/office/drawing/2014/main" id="{41BC7B37-56E6-BB14-8379-EF5526B6CFDA}"/>
-              </a:ext>
-            </a:extLst>
-          </p:cNvPr>
-          <p:cNvSpPr/>
-          <p:nvPr/>
-        </p:nvSpPr>
-        <p:spPr>
-          <a:xfrm rot="16200000" flipH="1">
-            <a:off x="5505413" y="1444522"/>
-            <a:ext cx="880851" cy="53960"/>
-          </a:xfrm>
-          <a:prstGeom prst="rect">
+          <a:prstGeom prst="ellipse">
             <a:avLst/>
           </a:prstGeom>
           <a:solidFill>
-            <a:srgbClr val="DB4437"/>
+            <a:schemeClr val="bg1"/>
           </a:solidFill>
           <a:ln>
-            <a:solidFill>
-              <a:srgbClr val="DB4437"/>
-            </a:solidFill>
+            <a:noFill/>
           </a:ln>
+          <a:effectLst>
+            <a:outerShdw blurRad="57785" dist="33020" dir="3180000" algn="ctr">
+              <a:srgbClr val="000000">
+                <a:alpha val="30000"/>
+              </a:srgbClr>
+            </a:outerShdw>
+          </a:effectLst>
+          <a:scene3d>
+            <a:camera prst="orthographicFront">
+              <a:rot lat="0" lon="0" rev="0"/>
+            </a:camera>
+            <a:lightRig rig="brightRoom" dir="t">
+              <a:rot lat="0" lon="0" rev="600000"/>
+            </a:lightRig>
+          </a:scene3d>
+          <a:sp3d prstMaterial="metal">
+            <a:bevelT w="38100" h="57150" prst="angle"/>
+          </a:sp3d>
         </p:spPr>
         <p:style>
           <a:lnRef idx="2">
@@ -4153,10 +3926,10 @@
       </p:sp>
       <p:sp>
         <p:nvSpPr>
-          <p:cNvPr id="20" name="Rectangle 19">
-            <a:extLst>
-              <a:ext uri="{FF2B5EF4-FFF2-40B4-BE49-F238E27FC236}">
-                <a16:creationId xmlns:a16="http://schemas.microsoft.com/office/drawing/2014/main" id="{24DCC654-F3D3-85F9-6B60-B418AE921DEC}"/>
+          <p:cNvPr id="9" name="Oval 8">
+            <a:extLst>
+              <a:ext uri="{FF2B5EF4-FFF2-40B4-BE49-F238E27FC236}">
+                <a16:creationId xmlns:a16="http://schemas.microsoft.com/office/drawing/2014/main" id="{8B3571DF-F3F1-6398-E0EA-9042F60BD0EE}"/>
               </a:ext>
             </a:extLst>
           </p:cNvPr>
@@ -4164,21 +3937,37 @@
           <p:nvPr/>
         </p:nvSpPr>
         <p:spPr>
-          <a:xfrm rot="16200000" flipH="1">
-            <a:off x="6921026" y="1444522"/>
-            <a:ext cx="880851" cy="53960"/>
+          <a:xfrm>
+            <a:off x="5448300" y="2782732"/>
+            <a:ext cx="1244600" cy="1244600"/>
           </a:xfrm>
-          <a:prstGeom prst="rect">
+          <a:prstGeom prst="ellipse">
             <a:avLst/>
           </a:prstGeom>
           <a:solidFill>
-            <a:srgbClr val="DB4437"/>
+            <a:schemeClr val="bg1"/>
           </a:solidFill>
           <a:ln>
-            <a:solidFill>
-              <a:srgbClr val="DB4437"/>
-            </a:solidFill>
+            <a:noFill/>
           </a:ln>
+          <a:effectLst>
+            <a:outerShdw blurRad="57785" dist="33020" dir="3180000" algn="ctr">
+              <a:srgbClr val="000000">
+                <a:alpha val="30000"/>
+              </a:srgbClr>
+            </a:outerShdw>
+          </a:effectLst>
+          <a:scene3d>
+            <a:camera prst="orthographicFront">
+              <a:rot lat="0" lon="0" rev="0"/>
+            </a:camera>
+            <a:lightRig rig="brightRoom" dir="t">
+              <a:rot lat="0" lon="0" rev="600000"/>
+            </a:lightRig>
+          </a:scene3d>
+          <a:sp3d prstMaterial="metal">
+            <a:bevelT w="38100" h="57150" prst="angle"/>
+          </a:sp3d>
         </p:spPr>
         <p:style>
           <a:lnRef idx="2">
@@ -4205,34 +3994,89 @@
           </a:p>
         </p:txBody>
       </p:sp>
-      <p:sp>
-        <p:nvSpPr>
-          <p:cNvPr id="23" name="Rectangle 22">
-            <a:extLst>
-              <a:ext uri="{FF2B5EF4-FFF2-40B4-BE49-F238E27FC236}">
-                <a16:creationId xmlns:a16="http://schemas.microsoft.com/office/drawing/2014/main" id="{D1543DB2-F74D-257E-CADC-B46ECD47B247}"/>
-              </a:ext>
-            </a:extLst>
-          </p:cNvPr>
-          <p:cNvSpPr/>
+      <p:pic>
+        <p:nvPicPr>
+          <p:cNvPr id="11" name="Graphic 10" descr="Bullseye with solid fill">
+            <a:extLst>
+              <a:ext uri="{FF2B5EF4-FFF2-40B4-BE49-F238E27FC236}">
+                <a16:creationId xmlns:a16="http://schemas.microsoft.com/office/drawing/2014/main" id="{D84EB95F-3AB6-3DC6-C623-49A1E7140A34}"/>
+              </a:ext>
+            </a:extLst>
+          </p:cNvPr>
+          <p:cNvPicPr>
+            <a:picLocks noChangeAspect="1"/>
+          </p:cNvPicPr>
           <p:nvPr/>
-        </p:nvSpPr>
+        </p:nvPicPr>
+        <p:blipFill>
+          <a:blip r:embed="rId3">
+            <a:extLst>
+              <a:ext uri="{28A0092B-C50C-407E-A947-70E740481C1C}">
+                <a14:useLocalDpi xmlns:a14="http://schemas.microsoft.com/office/drawing/2010/main" val="0"/>
+              </a:ext>
+              <a:ext uri="{96DAC541-7B7A-43D3-8B79-37D633B846F1}">
+                <asvg:svgBlip xmlns:asvg="http://schemas.microsoft.com/office/drawing/2016/SVG/main" r:embed="rId4"/>
+              </a:ext>
+            </a:extLst>
+          </a:blip>
+          <a:stretch>
+            <a:fillRect/>
+          </a:stretch>
+        </p:blipFill>
         <p:spPr>
-          <a:xfrm rot="16200000" flipH="1">
-            <a:off x="5505411" y="3425546"/>
-            <a:ext cx="880851" cy="53960"/>
+          <a:xfrm>
+            <a:off x="5586433" y="2895465"/>
+            <a:ext cx="1019134" cy="1019134"/>
           </a:xfrm>
           <a:prstGeom prst="rect">
             <a:avLst/>
           </a:prstGeom>
+        </p:spPr>
+      </p:pic>
+      <p:sp>
+        <p:nvSpPr>
+          <p:cNvPr id="13" name="Oval 12">
+            <a:extLst>
+              <a:ext uri="{FF2B5EF4-FFF2-40B4-BE49-F238E27FC236}">
+                <a16:creationId xmlns:a16="http://schemas.microsoft.com/office/drawing/2014/main" id="{CFE63D82-C7F7-66C7-0F81-40F51B756F27}"/>
+              </a:ext>
+            </a:extLst>
+          </p:cNvPr>
+          <p:cNvSpPr/>
+          <p:nvPr/>
+        </p:nvSpPr>
+        <p:spPr>
+          <a:xfrm>
+            <a:off x="9334500" y="2782732"/>
+            <a:ext cx="1244600" cy="1244600"/>
+          </a:xfrm>
+          <a:prstGeom prst="ellipse">
+            <a:avLst/>
+          </a:prstGeom>
           <a:solidFill>
-            <a:srgbClr val="DB4437"/>
+            <a:schemeClr val="bg1"/>
           </a:solidFill>
           <a:ln>
-            <a:solidFill>
-              <a:srgbClr val="DB4437"/>
-            </a:solidFill>
+            <a:noFill/>
           </a:ln>
+          <a:effectLst>
+            <a:outerShdw blurRad="57785" dist="33020" dir="3180000" algn="ctr">
+              <a:srgbClr val="000000">
+                <a:alpha val="30000"/>
+              </a:srgbClr>
+            </a:outerShdw>
+          </a:effectLst>
+          <a:scene3d>
+            <a:camera prst="orthographicFront">
+              <a:rot lat="0" lon="0" rev="0"/>
+            </a:camera>
+            <a:lightRig rig="brightRoom" dir="t">
+              <a:rot lat="0" lon="0" rev="600000"/>
+            </a:lightRig>
+          </a:scene3d>
+          <a:sp3d prstMaterial="metal">
+            <a:bevelT w="38100" h="57150" prst="angle"/>
+          </a:sp3d>
         </p:spPr>
         <p:style>
           <a:lnRef idx="2">
@@ -4259,366 +4103,51 @@
           </a:p>
         </p:txBody>
       </p:sp>
-      <p:sp>
-        <p:nvSpPr>
-          <p:cNvPr id="25" name="Rectangle 24">
-            <a:extLst>
-              <a:ext uri="{FF2B5EF4-FFF2-40B4-BE49-F238E27FC236}">
-                <a16:creationId xmlns:a16="http://schemas.microsoft.com/office/drawing/2014/main" id="{66F84D62-196F-2750-CB3C-7C3BB7D8D4BC}"/>
-              </a:ext>
-            </a:extLst>
-          </p:cNvPr>
-          <p:cNvSpPr/>
+      <p:pic>
+        <p:nvPicPr>
+          <p:cNvPr id="15" name="Graphic 14" descr="Lights On with solid fill">
+            <a:extLst>
+              <a:ext uri="{FF2B5EF4-FFF2-40B4-BE49-F238E27FC236}">
+                <a16:creationId xmlns:a16="http://schemas.microsoft.com/office/drawing/2014/main" id="{41F4B61A-E838-5B14-D5EF-AA53F22BD076}"/>
+              </a:ext>
+            </a:extLst>
+          </p:cNvPr>
+          <p:cNvPicPr>
+            <a:picLocks noChangeAspect="1"/>
+          </p:cNvPicPr>
           <p:nvPr/>
-        </p:nvSpPr>
+        </p:nvPicPr>
+        <p:blipFill>
+          <a:blip r:embed="rId5">
+            <a:extLst>
+              <a:ext uri="{28A0092B-C50C-407E-A947-70E740481C1C}">
+                <a14:useLocalDpi xmlns:a14="http://schemas.microsoft.com/office/drawing/2010/main" val="0"/>
+              </a:ext>
+              <a:ext uri="{96DAC541-7B7A-43D3-8B79-37D633B846F1}">
+                <asvg:svgBlip xmlns:asvg="http://schemas.microsoft.com/office/drawing/2016/SVG/main" r:embed="rId6"/>
+              </a:ext>
+            </a:extLst>
+          </a:blip>
+          <a:stretch>
+            <a:fillRect/>
+          </a:stretch>
+        </p:blipFill>
         <p:spPr>
-          <a:xfrm rot="16200000" flipH="1">
-            <a:off x="6921024" y="3425546"/>
-            <a:ext cx="880851" cy="53960"/>
+          <a:xfrm>
+            <a:off x="1707367" y="2927999"/>
+            <a:ext cx="954067" cy="954067"/>
           </a:xfrm>
           <a:prstGeom prst="rect">
             <a:avLst/>
           </a:prstGeom>
-          <a:solidFill>
-            <a:srgbClr val="DB4437"/>
-          </a:solidFill>
-          <a:ln>
-            <a:solidFill>
-              <a:srgbClr val="DB4437"/>
-            </a:solidFill>
-          </a:ln>
         </p:spPr>
-        <p:style>
-          <a:lnRef idx="2">
-            <a:schemeClr val="accent1">
-              <a:shade val="15000"/>
-            </a:schemeClr>
-          </a:lnRef>
-          <a:fillRef idx="1">
-            <a:schemeClr val="accent1"/>
-          </a:fillRef>
-          <a:effectRef idx="0">
-            <a:schemeClr val="accent1"/>
-          </a:effectRef>
-          <a:fontRef idx="minor">
-            <a:schemeClr val="lt1"/>
-          </a:fontRef>
-        </p:style>
-        <p:txBody>
-          <a:bodyPr rtlCol="0" anchor="ctr"/>
-          <a:lstStyle/>
-          <a:p>
-            <a:pPr algn="ctr"/>
-            <a:endParaRPr lang="en-US"/>
-          </a:p>
-        </p:txBody>
-      </p:sp>
-      <p:sp>
-        <p:nvSpPr>
-          <p:cNvPr id="26" name="Rectangle 25">
-            <a:extLst>
-              <a:ext uri="{FF2B5EF4-FFF2-40B4-BE49-F238E27FC236}">
-                <a16:creationId xmlns:a16="http://schemas.microsoft.com/office/drawing/2014/main" id="{6E25C376-3FCD-3119-B73B-2CEC16460DB4}"/>
-              </a:ext>
-            </a:extLst>
-          </p:cNvPr>
-          <p:cNvSpPr/>
-          <p:nvPr/>
-        </p:nvSpPr>
-        <p:spPr>
-          <a:xfrm rot="16200000" flipH="1">
-            <a:off x="5501973" y="5359519"/>
-            <a:ext cx="880851" cy="53960"/>
-          </a:xfrm>
-          <a:prstGeom prst="rect">
-            <a:avLst/>
-          </a:prstGeom>
-          <a:solidFill>
-            <a:srgbClr val="DB4437"/>
-          </a:solidFill>
-          <a:ln>
-            <a:solidFill>
-              <a:srgbClr val="DB4437"/>
-            </a:solidFill>
-          </a:ln>
-        </p:spPr>
-        <p:style>
-          <a:lnRef idx="2">
-            <a:schemeClr val="accent1">
-              <a:shade val="15000"/>
-            </a:schemeClr>
-          </a:lnRef>
-          <a:fillRef idx="1">
-            <a:schemeClr val="accent1"/>
-          </a:fillRef>
-          <a:effectRef idx="0">
-            <a:schemeClr val="accent1"/>
-          </a:effectRef>
-          <a:fontRef idx="minor">
-            <a:schemeClr val="lt1"/>
-          </a:fontRef>
-        </p:style>
-        <p:txBody>
-          <a:bodyPr rtlCol="0" anchor="ctr"/>
-          <a:lstStyle/>
-          <a:p>
-            <a:pPr algn="ctr"/>
-            <a:endParaRPr lang="en-US"/>
-          </a:p>
-        </p:txBody>
-      </p:sp>
-      <p:sp>
-        <p:nvSpPr>
-          <p:cNvPr id="27" name="Rectangle 26">
-            <a:extLst>
-              <a:ext uri="{FF2B5EF4-FFF2-40B4-BE49-F238E27FC236}">
-                <a16:creationId xmlns:a16="http://schemas.microsoft.com/office/drawing/2014/main" id="{57BFB8B3-6BE1-3AC0-BEE0-A618C38A74FC}"/>
-              </a:ext>
-            </a:extLst>
-          </p:cNvPr>
-          <p:cNvSpPr/>
-          <p:nvPr/>
-        </p:nvSpPr>
-        <p:spPr>
-          <a:xfrm rot="16200000" flipH="1">
-            <a:off x="6917586" y="5359519"/>
-            <a:ext cx="880851" cy="53960"/>
-          </a:xfrm>
-          <a:prstGeom prst="rect">
-            <a:avLst/>
-          </a:prstGeom>
-          <a:solidFill>
-            <a:srgbClr val="DB4437"/>
-          </a:solidFill>
-          <a:ln>
-            <a:solidFill>
-              <a:srgbClr val="DB4437"/>
-            </a:solidFill>
-          </a:ln>
-        </p:spPr>
-        <p:style>
-          <a:lnRef idx="2">
-            <a:schemeClr val="accent1">
-              <a:shade val="15000"/>
-            </a:schemeClr>
-          </a:lnRef>
-          <a:fillRef idx="1">
-            <a:schemeClr val="accent1"/>
-          </a:fillRef>
-          <a:effectRef idx="0">
-            <a:schemeClr val="accent1"/>
-          </a:effectRef>
-          <a:fontRef idx="minor">
-            <a:schemeClr val="lt1"/>
-          </a:fontRef>
-        </p:style>
-        <p:txBody>
-          <a:bodyPr rtlCol="0" anchor="ctr"/>
-          <a:lstStyle/>
-          <a:p>
-            <a:pPr algn="ctr"/>
-            <a:endParaRPr lang="en-US"/>
-          </a:p>
-        </p:txBody>
-      </p:sp>
-    </p:spTree>
-    <p:extLst>
-      <p:ext uri="{BB962C8B-B14F-4D97-AF65-F5344CB8AC3E}">
-        <p14:creationId xmlns:p14="http://schemas.microsoft.com/office/powerpoint/2010/main" val="2672600715"/>
-      </p:ext>
-    </p:extLst>
-  </p:cSld>
-  <p:clrMapOvr>
-    <a:masterClrMapping/>
-  </p:clrMapOvr>
-</p:sld>
-</file>
-
-<file path=ppt/slides/slide3.xml><?xml version="1.0" encoding="utf-8"?>
-<p:sld xmlns:a="http://schemas.openxmlformats.org/drawingml/2006/main" xmlns:r="http://schemas.openxmlformats.org/officeDocument/2006/relationships" xmlns:p="http://schemas.openxmlformats.org/presentationml/2006/main">
-  <p:cSld>
-    <p:spTree>
-      <p:nvGrpSpPr>
-        <p:cNvPr id="1" name=""/>
-        <p:cNvGrpSpPr/>
-        <p:nvPr/>
-      </p:nvGrpSpPr>
-      <p:grpSpPr>
-        <a:xfrm>
-          <a:off x="0" y="0"/>
-          <a:ext cx="0" cy="0"/>
-          <a:chOff x="0" y="0"/>
-          <a:chExt cx="0" cy="0"/>
-        </a:xfrm>
-      </p:grpSpPr>
-      <p:sp>
-        <p:nvSpPr>
-          <p:cNvPr id="3" name="Rectangle 2">
-            <a:extLst>
-              <a:ext uri="{FF2B5EF4-FFF2-40B4-BE49-F238E27FC236}">
-                <a16:creationId xmlns:a16="http://schemas.microsoft.com/office/drawing/2014/main" id="{3413C8CE-33EA-74D2-9495-E750C9507EE5}"/>
-              </a:ext>
-            </a:extLst>
-          </p:cNvPr>
-          <p:cNvSpPr/>
-          <p:nvPr/>
-        </p:nvSpPr>
-        <p:spPr>
-          <a:xfrm rot="16200000" flipH="1">
-            <a:off x="5991880" y="4805511"/>
-            <a:ext cx="1356188" cy="1147948"/>
-          </a:xfrm>
-          <a:prstGeom prst="rect">
-            <a:avLst/>
-          </a:prstGeom>
-          <a:solidFill>
-            <a:srgbClr val="DB4437"/>
-          </a:solidFill>
-          <a:ln>
-            <a:solidFill>
-              <a:srgbClr val="DB4437"/>
-            </a:solidFill>
-          </a:ln>
-        </p:spPr>
-        <p:style>
-          <a:lnRef idx="2">
-            <a:schemeClr val="accent1">
-              <a:shade val="15000"/>
-            </a:schemeClr>
-          </a:lnRef>
-          <a:fillRef idx="1">
-            <a:schemeClr val="accent1"/>
-          </a:fillRef>
-          <a:effectRef idx="0">
-            <a:schemeClr val="accent1"/>
-          </a:effectRef>
-          <a:fontRef idx="minor">
-            <a:schemeClr val="lt1"/>
-          </a:fontRef>
-        </p:style>
-        <p:txBody>
-          <a:bodyPr rtlCol="0" anchor="ctr"/>
-          <a:lstStyle/>
-          <a:p>
-            <a:pPr algn="ctr"/>
-            <a:endParaRPr lang="en-US"/>
-          </a:p>
-        </p:txBody>
-      </p:sp>
-      <p:sp>
-        <p:nvSpPr>
-          <p:cNvPr id="2" name="Rectangle 1">
-            <a:extLst>
-              <a:ext uri="{FF2B5EF4-FFF2-40B4-BE49-F238E27FC236}">
-                <a16:creationId xmlns:a16="http://schemas.microsoft.com/office/drawing/2014/main" id="{4B96D4A1-EF3C-BC30-33E7-918C7904AC8F}"/>
-              </a:ext>
-            </a:extLst>
-          </p:cNvPr>
-          <p:cNvSpPr/>
-          <p:nvPr/>
-        </p:nvSpPr>
-        <p:spPr>
-          <a:xfrm rot="16200000" flipH="1">
-            <a:off x="5991880" y="2834960"/>
-            <a:ext cx="1356188" cy="1147948"/>
-          </a:xfrm>
-          <a:prstGeom prst="rect">
-            <a:avLst/>
-          </a:prstGeom>
-          <a:solidFill>
-            <a:srgbClr val="DB4437"/>
-          </a:solidFill>
-          <a:ln>
-            <a:solidFill>
-              <a:srgbClr val="DB4437"/>
-            </a:solidFill>
-          </a:ln>
-        </p:spPr>
-        <p:style>
-          <a:lnRef idx="2">
-            <a:schemeClr val="accent1">
-              <a:shade val="15000"/>
-            </a:schemeClr>
-          </a:lnRef>
-          <a:fillRef idx="1">
-            <a:schemeClr val="accent1"/>
-          </a:fillRef>
-          <a:effectRef idx="0">
-            <a:schemeClr val="accent1"/>
-          </a:effectRef>
-          <a:fontRef idx="minor">
-            <a:schemeClr val="lt1"/>
-          </a:fontRef>
-        </p:style>
-        <p:txBody>
-          <a:bodyPr rtlCol="0" anchor="ctr"/>
-          <a:lstStyle/>
-          <a:p>
-            <a:pPr algn="ctr"/>
-            <a:endParaRPr lang="en-US"/>
-          </a:p>
-        </p:txBody>
-      </p:sp>
-      <p:sp>
-        <p:nvSpPr>
-          <p:cNvPr id="24" name="Rectangle 23">
-            <a:extLst>
-              <a:ext uri="{FF2B5EF4-FFF2-40B4-BE49-F238E27FC236}">
-                <a16:creationId xmlns:a16="http://schemas.microsoft.com/office/drawing/2014/main" id="{2A79EE62-7157-8B02-FC85-69F0BEBD8897}"/>
-              </a:ext>
-            </a:extLst>
-          </p:cNvPr>
-          <p:cNvSpPr/>
-          <p:nvPr/>
-        </p:nvSpPr>
-        <p:spPr>
-          <a:xfrm rot="16200000" flipH="1">
-            <a:off x="5991880" y="864408"/>
-            <a:ext cx="1356188" cy="1147948"/>
-          </a:xfrm>
-          <a:prstGeom prst="rect">
-            <a:avLst/>
-          </a:prstGeom>
-          <a:solidFill>
-            <a:srgbClr val="DB4437"/>
-          </a:solidFill>
-          <a:ln>
-            <a:solidFill>
-              <a:srgbClr val="DB4437"/>
-            </a:solidFill>
-          </a:ln>
-        </p:spPr>
-        <p:style>
-          <a:lnRef idx="2">
-            <a:schemeClr val="accent1">
-              <a:shade val="15000"/>
-            </a:schemeClr>
-          </a:lnRef>
-          <a:fillRef idx="1">
-            <a:schemeClr val="accent1"/>
-          </a:fillRef>
-          <a:effectRef idx="0">
-            <a:schemeClr val="accent1"/>
-          </a:effectRef>
-          <a:fontRef idx="minor">
-            <a:schemeClr val="lt1"/>
-          </a:fontRef>
-        </p:style>
-        <p:txBody>
-          <a:bodyPr rtlCol="0" anchor="ctr"/>
-          <a:lstStyle/>
-          <a:p>
-            <a:pPr algn="ctr"/>
-            <a:endParaRPr lang="en-US"/>
-          </a:p>
-        </p:txBody>
-      </p:sp>
-      <p:sp>
-        <p:nvSpPr>
-          <p:cNvPr id="5" name="Title 1">
-            <a:extLst>
-              <a:ext uri="{FF2B5EF4-FFF2-40B4-BE49-F238E27FC236}">
-                <a16:creationId xmlns:a16="http://schemas.microsoft.com/office/drawing/2014/main" id="{04B84D17-BAAC-ADA2-4844-1DBC666F0FD1}"/>
+      </p:pic>
+      <p:sp>
+        <p:nvSpPr>
+          <p:cNvPr id="17" name="Title 1">
+            <a:extLst>
+              <a:ext uri="{FF2B5EF4-FFF2-40B4-BE49-F238E27FC236}">
+                <a16:creationId xmlns:a16="http://schemas.microsoft.com/office/drawing/2014/main" id="{B9E9C29F-4631-CF6C-2855-B1003D462ACA}"/>
               </a:ext>
             </a:extLst>
           </p:cNvPr>
@@ -4629,8 +4158,8 @@
         </p:nvSpPr>
         <p:spPr>
           <a:xfrm>
-            <a:off x="7787297" y="1031076"/>
-            <a:ext cx="2929139" cy="793668"/>
+            <a:off x="4606030" y="4138633"/>
+            <a:ext cx="2929139" cy="649267"/>
           </a:xfrm>
           <a:prstGeom prst="rect">
             <a:avLst/>
@@ -4660,23 +4189,22 @@
             </a:lvl1pPr>
           </a:lstStyle>
           <a:p>
-            <a:pPr algn="l"/>
             <a:r>
               <a:rPr lang="en-US" sz="2400" dirty="0">
                 <a:latin typeface="Poppins Medium" panose="00000600000000000000" pitchFamily="2" charset="0"/>
                 <a:cs typeface="Poppins Medium" panose="00000600000000000000" pitchFamily="2" charset="0"/>
               </a:rPr>
-              <a:t>Introduction</a:t>
-            </a:r>
-          </a:p>
-        </p:txBody>
-      </p:sp>
-      <p:sp>
-        <p:nvSpPr>
-          <p:cNvPr id="8" name="Title 1">
-            <a:extLst>
-              <a:ext uri="{FF2B5EF4-FFF2-40B4-BE49-F238E27FC236}">
-                <a16:creationId xmlns:a16="http://schemas.microsoft.com/office/drawing/2014/main" id="{9A71E735-7D51-CA31-9B13-51D2CCBBED3D}"/>
+              <a:t>Use Case</a:t>
+            </a:r>
+          </a:p>
+        </p:txBody>
+      </p:sp>
+      <p:sp>
+        <p:nvSpPr>
+          <p:cNvPr id="18" name="Title 1">
+            <a:extLst>
+              <a:ext uri="{FF2B5EF4-FFF2-40B4-BE49-F238E27FC236}">
+                <a16:creationId xmlns:a16="http://schemas.microsoft.com/office/drawing/2014/main" id="{EF3B0ECE-720F-21AC-FAE6-4D112FC3B6B9}"/>
               </a:ext>
             </a:extLst>
           </p:cNvPr>
@@ -4687,8 +4215,8 @@
         </p:nvSpPr>
         <p:spPr>
           <a:xfrm>
-            <a:off x="7787296" y="3049432"/>
-            <a:ext cx="2929139" cy="742754"/>
+            <a:off x="8517863" y="4138632"/>
+            <a:ext cx="2929139" cy="649267"/>
           </a:xfrm>
           <a:prstGeom prst="rect">
             <a:avLst/>
@@ -4718,23 +4246,22 @@
             </a:lvl1pPr>
           </a:lstStyle>
           <a:p>
-            <a:pPr algn="l"/>
             <a:r>
               <a:rPr lang="en-US" sz="2400" dirty="0">
                 <a:latin typeface="Poppins Medium" panose="00000600000000000000" pitchFamily="2" charset="0"/>
                 <a:cs typeface="Poppins Medium" panose="00000600000000000000" pitchFamily="2" charset="0"/>
               </a:rPr>
-              <a:t>Use Case</a:t>
-            </a:r>
-          </a:p>
-        </p:txBody>
-      </p:sp>
-      <p:sp>
-        <p:nvSpPr>
-          <p:cNvPr id="10" name="Title 1">
-            <a:extLst>
-              <a:ext uri="{FF2B5EF4-FFF2-40B4-BE49-F238E27FC236}">
-                <a16:creationId xmlns:a16="http://schemas.microsoft.com/office/drawing/2014/main" id="{E126F713-CEAA-09B1-CEF6-A5C8D8BAB0C6}"/>
+              <a:t>Case Study</a:t>
+            </a:r>
+          </a:p>
+        </p:txBody>
+      </p:sp>
+      <p:sp>
+        <p:nvSpPr>
+          <p:cNvPr id="19" name="Title 1">
+            <a:extLst>
+              <a:ext uri="{FF2B5EF4-FFF2-40B4-BE49-F238E27FC236}">
+                <a16:creationId xmlns:a16="http://schemas.microsoft.com/office/drawing/2014/main" id="{07476AA8-B2FF-9F7D-36A8-FE5006C48899}"/>
               </a:ext>
             </a:extLst>
           </p:cNvPr>
@@ -4745,8 +4272,8 @@
         </p:nvSpPr>
         <p:spPr>
           <a:xfrm>
-            <a:off x="7787298" y="5036122"/>
-            <a:ext cx="2929139" cy="750670"/>
+            <a:off x="703177" y="5172899"/>
+            <a:ext cx="2929139" cy="649267"/>
           </a:xfrm>
           <a:prstGeom prst="rect">
             <a:avLst/>
@@ -4776,23 +4303,27 @@
             </a:lvl1pPr>
           </a:lstStyle>
           <a:p>
-            <a:pPr algn="l"/>
-            <a:r>
-              <a:rPr lang="en-US" sz="2400" dirty="0">
+            <a:r>
+              <a:rPr lang="en-US" sz="3600" dirty="0">
+                <a:solidFill>
+                  <a:schemeClr val="bg1">
+                    <a:lumMod val="75000"/>
+                  </a:schemeClr>
+                </a:solidFill>
                 <a:latin typeface="Poppins Medium" panose="00000600000000000000" pitchFamily="2" charset="0"/>
                 <a:cs typeface="Poppins Medium" panose="00000600000000000000" pitchFamily="2" charset="0"/>
               </a:rPr>
-              <a:t>Case Study</a:t>
-            </a:r>
-          </a:p>
-        </p:txBody>
-      </p:sp>
-      <p:sp>
-        <p:nvSpPr>
-          <p:cNvPr id="12" name="Title 1">
-            <a:extLst>
-              <a:ext uri="{FF2B5EF4-FFF2-40B4-BE49-F238E27FC236}">
-                <a16:creationId xmlns:a16="http://schemas.microsoft.com/office/drawing/2014/main" id="{8A2E8E83-5D9B-B0FA-6522-2202C6218135}"/>
+              <a:t>01.</a:t>
+            </a:r>
+          </a:p>
+        </p:txBody>
+      </p:sp>
+      <p:sp>
+        <p:nvSpPr>
+          <p:cNvPr id="20" name="Title 1">
+            <a:extLst>
+              <a:ext uri="{FF2B5EF4-FFF2-40B4-BE49-F238E27FC236}">
+                <a16:creationId xmlns:a16="http://schemas.microsoft.com/office/drawing/2014/main" id="{0FE92C30-D529-840E-5270-DE4C1BA2118F}"/>
               </a:ext>
             </a:extLst>
           </p:cNvPr>
@@ -4803,8 +4334,8 @@
         </p:nvSpPr>
         <p:spPr>
           <a:xfrm>
-            <a:off x="1097585" y="2630606"/>
-            <a:ext cx="2990496" cy="1596788"/>
+            <a:off x="4610891" y="5172898"/>
+            <a:ext cx="2929139" cy="649267"/>
           </a:xfrm>
           <a:prstGeom prst="rect">
             <a:avLst/>
@@ -4834,884 +4365,39 @@
             </a:lvl1pPr>
           </a:lstStyle>
           <a:p>
-            <a:pPr algn="l"/>
-            <a:r>
-              <a:rPr lang="en-US" sz="4800" dirty="0">
+            <a:r>
+              <a:rPr lang="en-US" sz="3600" dirty="0">
+                <a:solidFill>
+                  <a:schemeClr val="bg1">
+                    <a:lumMod val="75000"/>
+                  </a:schemeClr>
+                </a:solidFill>
                 <a:latin typeface="Poppins Medium" panose="00000600000000000000" pitchFamily="2" charset="0"/>
                 <a:cs typeface="Poppins Medium" panose="00000600000000000000" pitchFamily="2" charset="0"/>
               </a:rPr>
-              <a:t>Table of Contents</a:t>
-            </a:r>
-          </a:p>
-        </p:txBody>
-      </p:sp>
-      <p:pic>
-        <p:nvPicPr>
-          <p:cNvPr id="14" name="Graphic 13" descr="Lights On with solid fill">
-            <a:extLst>
-              <a:ext uri="{FF2B5EF4-FFF2-40B4-BE49-F238E27FC236}">
-                <a16:creationId xmlns:a16="http://schemas.microsoft.com/office/drawing/2014/main" id="{42C7C49D-1E61-EF8F-9D8D-95563035FF6A}"/>
-              </a:ext>
-            </a:extLst>
-          </p:cNvPr>
-          <p:cNvPicPr>
-            <a:picLocks noChangeAspect="1"/>
-          </p:cNvPicPr>
+              <a:t>02.</a:t>
+            </a:r>
+          </a:p>
+        </p:txBody>
+      </p:sp>
+      <p:sp>
+        <p:nvSpPr>
+          <p:cNvPr id="21" name="Title 1">
+            <a:extLst>
+              <a:ext uri="{FF2B5EF4-FFF2-40B4-BE49-F238E27FC236}">
+                <a16:creationId xmlns:a16="http://schemas.microsoft.com/office/drawing/2014/main" id="{6D8F1A41-B1FF-BF79-FC22-961054CA53E0}"/>
+              </a:ext>
+            </a:extLst>
+          </p:cNvPr>
+          <p:cNvSpPr txBox="1">
+            <a:spLocks/>
+          </p:cNvSpPr>
           <p:nvPr/>
-        </p:nvPicPr>
-        <p:blipFill>
-          <a:blip r:embed="rId2">
-            <a:extLst>
-              <a:ext uri="{28A0092B-C50C-407E-A947-70E740481C1C}">
-                <a14:useLocalDpi xmlns:a14="http://schemas.microsoft.com/office/drawing/2010/main" val="0"/>
-              </a:ext>
-              <a:ext uri="{96DAC541-7B7A-43D3-8B79-37D633B846F1}">
-                <asvg:svgBlip xmlns:asvg="http://schemas.microsoft.com/office/drawing/2016/SVG/main" r:embed="rId3"/>
-              </a:ext>
-            </a:extLst>
-          </a:blip>
-          <a:stretch>
-            <a:fillRect/>
-          </a:stretch>
-        </p:blipFill>
+        </p:nvSpPr>
         <p:spPr>
           <a:xfrm>
-            <a:off x="6273140" y="1031076"/>
-            <a:ext cx="793668" cy="793668"/>
-          </a:xfrm>
-          <a:prstGeom prst="rect">
-            <a:avLst/>
-          </a:prstGeom>
-        </p:spPr>
-      </p:pic>
-      <p:pic>
-        <p:nvPicPr>
-          <p:cNvPr id="16" name="Graphic 15" descr="Bullseye with solid fill">
-            <a:extLst>
-              <a:ext uri="{FF2B5EF4-FFF2-40B4-BE49-F238E27FC236}">
-                <a16:creationId xmlns:a16="http://schemas.microsoft.com/office/drawing/2014/main" id="{812E2CD3-219E-38D5-24F7-D2D765F2A364}"/>
-              </a:ext>
-            </a:extLst>
-          </p:cNvPr>
-          <p:cNvPicPr>
-            <a:picLocks noChangeAspect="1"/>
-          </p:cNvPicPr>
-          <p:nvPr/>
-        </p:nvPicPr>
-        <p:blipFill>
-          <a:blip r:embed="rId4">
-            <a:extLst>
-              <a:ext uri="{28A0092B-C50C-407E-A947-70E740481C1C}">
-                <a14:useLocalDpi xmlns:a14="http://schemas.microsoft.com/office/drawing/2010/main" val="0"/>
-              </a:ext>
-              <a:ext uri="{96DAC541-7B7A-43D3-8B79-37D633B846F1}">
-                <asvg:svgBlip xmlns:asvg="http://schemas.microsoft.com/office/drawing/2016/SVG/main" r:embed="rId5"/>
-              </a:ext>
-            </a:extLst>
-          </a:blip>
-          <a:stretch>
-            <a:fillRect/>
-          </a:stretch>
-        </p:blipFill>
-        <p:spPr>
-          <a:xfrm>
-            <a:off x="6273140" y="3012100"/>
-            <a:ext cx="793668" cy="793668"/>
-          </a:xfrm>
-          <a:prstGeom prst="rect">
-            <a:avLst/>
-          </a:prstGeom>
-        </p:spPr>
-      </p:pic>
-      <p:pic>
-        <p:nvPicPr>
-          <p:cNvPr id="18" name="Graphic 17" descr="Clipboard with solid fill">
-            <a:extLst>
-              <a:ext uri="{FF2B5EF4-FFF2-40B4-BE49-F238E27FC236}">
-                <a16:creationId xmlns:a16="http://schemas.microsoft.com/office/drawing/2014/main" id="{A3C48E83-2B28-B7BC-2369-9850479D9A69}"/>
-              </a:ext>
-            </a:extLst>
-          </p:cNvPr>
-          <p:cNvPicPr>
-            <a:picLocks noChangeAspect="1"/>
-          </p:cNvPicPr>
-          <p:nvPr/>
-        </p:nvPicPr>
-        <p:blipFill>
-          <a:blip r:embed="rId6">
-            <a:extLst>
-              <a:ext uri="{28A0092B-C50C-407E-A947-70E740481C1C}">
-                <a14:useLocalDpi xmlns:a14="http://schemas.microsoft.com/office/drawing/2010/main" val="0"/>
-              </a:ext>
-              <a:ext uri="{96DAC541-7B7A-43D3-8B79-37D633B846F1}">
-                <asvg:svgBlip xmlns:asvg="http://schemas.microsoft.com/office/drawing/2016/SVG/main" r:embed="rId7"/>
-              </a:ext>
-            </a:extLst>
-          </a:blip>
-          <a:stretch>
-            <a:fillRect/>
-          </a:stretch>
-        </p:blipFill>
-        <p:spPr>
-          <a:xfrm>
-            <a:off x="6273140" y="4993124"/>
-            <a:ext cx="793668" cy="793668"/>
-          </a:xfrm>
-          <a:prstGeom prst="rect">
-            <a:avLst/>
-          </a:prstGeom>
-        </p:spPr>
-      </p:pic>
-      <p:sp>
-        <p:nvSpPr>
-          <p:cNvPr id="19" name="Rectangle 18">
-            <a:extLst>
-              <a:ext uri="{FF2B5EF4-FFF2-40B4-BE49-F238E27FC236}">
-                <a16:creationId xmlns:a16="http://schemas.microsoft.com/office/drawing/2014/main" id="{41BC7B37-56E6-BB14-8379-EF5526B6CFDA}"/>
-              </a:ext>
-            </a:extLst>
-          </p:cNvPr>
-          <p:cNvSpPr/>
-          <p:nvPr/>
-        </p:nvSpPr>
-        <p:spPr>
-          <a:xfrm rot="16200000" flipH="1">
-            <a:off x="5505413" y="1444522"/>
-            <a:ext cx="880851" cy="53960"/>
-          </a:xfrm>
-          <a:prstGeom prst="rect">
-            <a:avLst/>
-          </a:prstGeom>
-          <a:solidFill>
-            <a:srgbClr val="DB4437"/>
-          </a:solidFill>
-          <a:ln>
-            <a:solidFill>
-              <a:srgbClr val="DB4437"/>
-            </a:solidFill>
-          </a:ln>
-        </p:spPr>
-        <p:style>
-          <a:lnRef idx="2">
-            <a:schemeClr val="accent1">
-              <a:shade val="15000"/>
-            </a:schemeClr>
-          </a:lnRef>
-          <a:fillRef idx="1">
-            <a:schemeClr val="accent1"/>
-          </a:fillRef>
-          <a:effectRef idx="0">
-            <a:schemeClr val="accent1"/>
-          </a:effectRef>
-          <a:fontRef idx="minor">
-            <a:schemeClr val="lt1"/>
-          </a:fontRef>
-        </p:style>
-        <p:txBody>
-          <a:bodyPr rtlCol="0" anchor="ctr"/>
-          <a:lstStyle/>
-          <a:p>
-            <a:pPr algn="ctr"/>
-            <a:endParaRPr lang="en-US"/>
-          </a:p>
-        </p:txBody>
-      </p:sp>
-      <p:sp>
-        <p:nvSpPr>
-          <p:cNvPr id="20" name="Rectangle 19">
-            <a:extLst>
-              <a:ext uri="{FF2B5EF4-FFF2-40B4-BE49-F238E27FC236}">
-                <a16:creationId xmlns:a16="http://schemas.microsoft.com/office/drawing/2014/main" id="{24DCC654-F3D3-85F9-6B60-B418AE921DEC}"/>
-              </a:ext>
-            </a:extLst>
-          </p:cNvPr>
-          <p:cNvSpPr/>
-          <p:nvPr/>
-        </p:nvSpPr>
-        <p:spPr>
-          <a:xfrm rot="16200000" flipH="1">
-            <a:off x="6921026" y="1444522"/>
-            <a:ext cx="880851" cy="53960"/>
-          </a:xfrm>
-          <a:prstGeom prst="rect">
-            <a:avLst/>
-          </a:prstGeom>
-          <a:solidFill>
-            <a:srgbClr val="DB4437"/>
-          </a:solidFill>
-          <a:ln>
-            <a:solidFill>
-              <a:srgbClr val="DB4437"/>
-            </a:solidFill>
-          </a:ln>
-        </p:spPr>
-        <p:style>
-          <a:lnRef idx="2">
-            <a:schemeClr val="accent1">
-              <a:shade val="15000"/>
-            </a:schemeClr>
-          </a:lnRef>
-          <a:fillRef idx="1">
-            <a:schemeClr val="accent1"/>
-          </a:fillRef>
-          <a:effectRef idx="0">
-            <a:schemeClr val="accent1"/>
-          </a:effectRef>
-          <a:fontRef idx="minor">
-            <a:schemeClr val="lt1"/>
-          </a:fontRef>
-        </p:style>
-        <p:txBody>
-          <a:bodyPr rtlCol="0" anchor="ctr"/>
-          <a:lstStyle/>
-          <a:p>
-            <a:pPr algn="ctr"/>
-            <a:endParaRPr lang="en-US"/>
-          </a:p>
-        </p:txBody>
-      </p:sp>
-      <p:sp>
-        <p:nvSpPr>
-          <p:cNvPr id="23" name="Rectangle 22">
-            <a:extLst>
-              <a:ext uri="{FF2B5EF4-FFF2-40B4-BE49-F238E27FC236}">
-                <a16:creationId xmlns:a16="http://schemas.microsoft.com/office/drawing/2014/main" id="{D1543DB2-F74D-257E-CADC-B46ECD47B247}"/>
-              </a:ext>
-            </a:extLst>
-          </p:cNvPr>
-          <p:cNvSpPr/>
-          <p:nvPr/>
-        </p:nvSpPr>
-        <p:spPr>
-          <a:xfrm rot="16200000" flipH="1">
-            <a:off x="5505411" y="3425546"/>
-            <a:ext cx="880851" cy="53960"/>
-          </a:xfrm>
-          <a:prstGeom prst="rect">
-            <a:avLst/>
-          </a:prstGeom>
-          <a:solidFill>
-            <a:srgbClr val="DB4437"/>
-          </a:solidFill>
-          <a:ln>
-            <a:solidFill>
-              <a:srgbClr val="DB4437"/>
-            </a:solidFill>
-          </a:ln>
-        </p:spPr>
-        <p:style>
-          <a:lnRef idx="2">
-            <a:schemeClr val="accent1">
-              <a:shade val="15000"/>
-            </a:schemeClr>
-          </a:lnRef>
-          <a:fillRef idx="1">
-            <a:schemeClr val="accent1"/>
-          </a:fillRef>
-          <a:effectRef idx="0">
-            <a:schemeClr val="accent1"/>
-          </a:effectRef>
-          <a:fontRef idx="minor">
-            <a:schemeClr val="lt1"/>
-          </a:fontRef>
-        </p:style>
-        <p:txBody>
-          <a:bodyPr rtlCol="0" anchor="ctr"/>
-          <a:lstStyle/>
-          <a:p>
-            <a:pPr algn="ctr"/>
-            <a:endParaRPr lang="en-US"/>
-          </a:p>
-        </p:txBody>
-      </p:sp>
-      <p:sp>
-        <p:nvSpPr>
-          <p:cNvPr id="25" name="Rectangle 24">
-            <a:extLst>
-              <a:ext uri="{FF2B5EF4-FFF2-40B4-BE49-F238E27FC236}">
-                <a16:creationId xmlns:a16="http://schemas.microsoft.com/office/drawing/2014/main" id="{66F84D62-196F-2750-CB3C-7C3BB7D8D4BC}"/>
-              </a:ext>
-            </a:extLst>
-          </p:cNvPr>
-          <p:cNvSpPr/>
-          <p:nvPr/>
-        </p:nvSpPr>
-        <p:spPr>
-          <a:xfrm rot="16200000" flipH="1">
-            <a:off x="6921024" y="3425546"/>
-            <a:ext cx="880851" cy="53960"/>
-          </a:xfrm>
-          <a:prstGeom prst="rect">
-            <a:avLst/>
-          </a:prstGeom>
-          <a:solidFill>
-            <a:srgbClr val="DB4437"/>
-          </a:solidFill>
-          <a:ln>
-            <a:solidFill>
-              <a:srgbClr val="DB4437"/>
-            </a:solidFill>
-          </a:ln>
-        </p:spPr>
-        <p:style>
-          <a:lnRef idx="2">
-            <a:schemeClr val="accent1">
-              <a:shade val="15000"/>
-            </a:schemeClr>
-          </a:lnRef>
-          <a:fillRef idx="1">
-            <a:schemeClr val="accent1"/>
-          </a:fillRef>
-          <a:effectRef idx="0">
-            <a:schemeClr val="accent1"/>
-          </a:effectRef>
-          <a:fontRef idx="minor">
-            <a:schemeClr val="lt1"/>
-          </a:fontRef>
-        </p:style>
-        <p:txBody>
-          <a:bodyPr rtlCol="0" anchor="ctr"/>
-          <a:lstStyle/>
-          <a:p>
-            <a:pPr algn="ctr"/>
-            <a:endParaRPr lang="en-US"/>
-          </a:p>
-        </p:txBody>
-      </p:sp>
-      <p:sp>
-        <p:nvSpPr>
-          <p:cNvPr id="26" name="Rectangle 25">
-            <a:extLst>
-              <a:ext uri="{FF2B5EF4-FFF2-40B4-BE49-F238E27FC236}">
-                <a16:creationId xmlns:a16="http://schemas.microsoft.com/office/drawing/2014/main" id="{6E25C376-3FCD-3119-B73B-2CEC16460DB4}"/>
-              </a:ext>
-            </a:extLst>
-          </p:cNvPr>
-          <p:cNvSpPr/>
-          <p:nvPr/>
-        </p:nvSpPr>
-        <p:spPr>
-          <a:xfrm rot="16200000" flipH="1">
-            <a:off x="5501973" y="5359519"/>
-            <a:ext cx="880851" cy="53960"/>
-          </a:xfrm>
-          <a:prstGeom prst="rect">
-            <a:avLst/>
-          </a:prstGeom>
-          <a:solidFill>
-            <a:srgbClr val="DB4437"/>
-          </a:solidFill>
-          <a:ln>
-            <a:solidFill>
-              <a:srgbClr val="DB4437"/>
-            </a:solidFill>
-          </a:ln>
-        </p:spPr>
-        <p:style>
-          <a:lnRef idx="2">
-            <a:schemeClr val="accent1">
-              <a:shade val="15000"/>
-            </a:schemeClr>
-          </a:lnRef>
-          <a:fillRef idx="1">
-            <a:schemeClr val="accent1"/>
-          </a:fillRef>
-          <a:effectRef idx="0">
-            <a:schemeClr val="accent1"/>
-          </a:effectRef>
-          <a:fontRef idx="minor">
-            <a:schemeClr val="lt1"/>
-          </a:fontRef>
-        </p:style>
-        <p:txBody>
-          <a:bodyPr rtlCol="0" anchor="ctr"/>
-          <a:lstStyle/>
-          <a:p>
-            <a:pPr algn="ctr"/>
-            <a:endParaRPr lang="en-US"/>
-          </a:p>
-        </p:txBody>
-      </p:sp>
-      <p:sp>
-        <p:nvSpPr>
-          <p:cNvPr id="27" name="Rectangle 26">
-            <a:extLst>
-              <a:ext uri="{FF2B5EF4-FFF2-40B4-BE49-F238E27FC236}">
-                <a16:creationId xmlns:a16="http://schemas.microsoft.com/office/drawing/2014/main" id="{57BFB8B3-6BE1-3AC0-BEE0-A618C38A74FC}"/>
-              </a:ext>
-            </a:extLst>
-          </p:cNvPr>
-          <p:cNvSpPr/>
-          <p:nvPr/>
-        </p:nvSpPr>
-        <p:spPr>
-          <a:xfrm rot="16200000" flipH="1">
-            <a:off x="6917586" y="5359519"/>
-            <a:ext cx="880851" cy="53960"/>
-          </a:xfrm>
-          <a:prstGeom prst="rect">
-            <a:avLst/>
-          </a:prstGeom>
-          <a:solidFill>
-            <a:srgbClr val="DB4437"/>
-          </a:solidFill>
-          <a:ln>
-            <a:solidFill>
-              <a:srgbClr val="DB4437"/>
-            </a:solidFill>
-          </a:ln>
-        </p:spPr>
-        <p:style>
-          <a:lnRef idx="2">
-            <a:schemeClr val="accent1">
-              <a:shade val="15000"/>
-            </a:schemeClr>
-          </a:lnRef>
-          <a:fillRef idx="1">
-            <a:schemeClr val="accent1"/>
-          </a:fillRef>
-          <a:effectRef idx="0">
-            <a:schemeClr val="accent1"/>
-          </a:effectRef>
-          <a:fontRef idx="minor">
-            <a:schemeClr val="lt1"/>
-          </a:fontRef>
-        </p:style>
-        <p:txBody>
-          <a:bodyPr rtlCol="0" anchor="ctr"/>
-          <a:lstStyle/>
-          <a:p>
-            <a:pPr algn="ctr"/>
-            <a:endParaRPr lang="en-US"/>
-          </a:p>
-        </p:txBody>
-      </p:sp>
-      <p:sp>
-        <p:nvSpPr>
-          <p:cNvPr id="4" name="Rectangle 3">
-            <a:extLst>
-              <a:ext uri="{FF2B5EF4-FFF2-40B4-BE49-F238E27FC236}">
-                <a16:creationId xmlns:a16="http://schemas.microsoft.com/office/drawing/2014/main" id="{86CE7B12-390F-7571-FE9A-CD2BAB028175}"/>
-              </a:ext>
-            </a:extLst>
-          </p:cNvPr>
-          <p:cNvSpPr/>
-          <p:nvPr/>
-        </p:nvSpPr>
-        <p:spPr>
-          <a:xfrm rot="16200000" flipH="1">
-            <a:off x="6291633" y="332622"/>
-            <a:ext cx="760288" cy="95043"/>
-          </a:xfrm>
-          <a:prstGeom prst="rect">
-            <a:avLst/>
-          </a:prstGeom>
-          <a:solidFill>
-            <a:srgbClr val="DB4437"/>
-          </a:solidFill>
-          <a:ln>
-            <a:solidFill>
-              <a:srgbClr val="DB4437"/>
-            </a:solidFill>
-          </a:ln>
-        </p:spPr>
-        <p:style>
-          <a:lnRef idx="2">
-            <a:schemeClr val="accent1">
-              <a:shade val="15000"/>
-            </a:schemeClr>
-          </a:lnRef>
-          <a:fillRef idx="1">
-            <a:schemeClr val="accent1"/>
-          </a:fillRef>
-          <a:effectRef idx="0">
-            <a:schemeClr val="accent1"/>
-          </a:effectRef>
-          <a:fontRef idx="minor">
-            <a:schemeClr val="lt1"/>
-          </a:fontRef>
-        </p:style>
-        <p:txBody>
-          <a:bodyPr rtlCol="0" anchor="ctr"/>
-          <a:lstStyle/>
-          <a:p>
-            <a:pPr algn="ctr"/>
-            <a:endParaRPr lang="en-US"/>
-          </a:p>
-        </p:txBody>
-      </p:sp>
-      <p:sp>
-        <p:nvSpPr>
-          <p:cNvPr id="6" name="Rectangle 5">
-            <a:extLst>
-              <a:ext uri="{FF2B5EF4-FFF2-40B4-BE49-F238E27FC236}">
-                <a16:creationId xmlns:a16="http://schemas.microsoft.com/office/drawing/2014/main" id="{BE7C2F47-2A73-145A-1874-A90E336F1693}"/>
-              </a:ext>
-            </a:extLst>
-          </p:cNvPr>
-          <p:cNvSpPr/>
-          <p:nvPr/>
-        </p:nvSpPr>
-        <p:spPr>
-          <a:xfrm rot="16200000" flipH="1">
-            <a:off x="6289830" y="2412531"/>
-            <a:ext cx="760288" cy="95043"/>
-          </a:xfrm>
-          <a:prstGeom prst="rect">
-            <a:avLst/>
-          </a:prstGeom>
-          <a:solidFill>
-            <a:srgbClr val="DB4437"/>
-          </a:solidFill>
-          <a:ln>
-            <a:solidFill>
-              <a:srgbClr val="DB4437"/>
-            </a:solidFill>
-          </a:ln>
-        </p:spPr>
-        <p:style>
-          <a:lnRef idx="2">
-            <a:schemeClr val="accent1">
-              <a:shade val="15000"/>
-            </a:schemeClr>
-          </a:lnRef>
-          <a:fillRef idx="1">
-            <a:schemeClr val="accent1"/>
-          </a:fillRef>
-          <a:effectRef idx="0">
-            <a:schemeClr val="accent1"/>
-          </a:effectRef>
-          <a:fontRef idx="minor">
-            <a:schemeClr val="lt1"/>
-          </a:fontRef>
-        </p:style>
-        <p:txBody>
-          <a:bodyPr rtlCol="0" anchor="ctr"/>
-          <a:lstStyle/>
-          <a:p>
-            <a:pPr algn="ctr"/>
-            <a:endParaRPr lang="en-US"/>
-          </a:p>
-        </p:txBody>
-      </p:sp>
-      <p:sp>
-        <p:nvSpPr>
-          <p:cNvPr id="7" name="Rectangle 6">
-            <a:extLst>
-              <a:ext uri="{FF2B5EF4-FFF2-40B4-BE49-F238E27FC236}">
-                <a16:creationId xmlns:a16="http://schemas.microsoft.com/office/drawing/2014/main" id="{D83427C3-0E7F-F104-0EE0-CEF0BA5585E5}"/>
-              </a:ext>
-            </a:extLst>
-          </p:cNvPr>
-          <p:cNvSpPr/>
-          <p:nvPr/>
-        </p:nvSpPr>
-        <p:spPr>
-          <a:xfrm rot="16200000" flipH="1">
-            <a:off x="6289829" y="4372609"/>
-            <a:ext cx="760288" cy="95043"/>
-          </a:xfrm>
-          <a:prstGeom prst="rect">
-            <a:avLst/>
-          </a:prstGeom>
-          <a:solidFill>
-            <a:srgbClr val="DB4437"/>
-          </a:solidFill>
-          <a:ln>
-            <a:solidFill>
-              <a:srgbClr val="DB4437"/>
-            </a:solidFill>
-          </a:ln>
-        </p:spPr>
-        <p:style>
-          <a:lnRef idx="2">
-            <a:schemeClr val="accent1">
-              <a:shade val="15000"/>
-            </a:schemeClr>
-          </a:lnRef>
-          <a:fillRef idx="1">
-            <a:schemeClr val="accent1"/>
-          </a:fillRef>
-          <a:effectRef idx="0">
-            <a:schemeClr val="accent1"/>
-          </a:effectRef>
-          <a:fontRef idx="minor">
-            <a:schemeClr val="lt1"/>
-          </a:fontRef>
-        </p:style>
-        <p:txBody>
-          <a:bodyPr rtlCol="0" anchor="ctr"/>
-          <a:lstStyle/>
-          <a:p>
-            <a:pPr algn="ctr"/>
-            <a:endParaRPr lang="en-US"/>
-          </a:p>
-        </p:txBody>
-      </p:sp>
-      <p:sp>
-        <p:nvSpPr>
-          <p:cNvPr id="9" name="Rectangle 8">
-            <a:extLst>
-              <a:ext uri="{FF2B5EF4-FFF2-40B4-BE49-F238E27FC236}">
-                <a16:creationId xmlns:a16="http://schemas.microsoft.com/office/drawing/2014/main" id="{79FB3799-3CFE-C77F-F56F-0FA1DF01A19A}"/>
-              </a:ext>
-            </a:extLst>
-          </p:cNvPr>
-          <p:cNvSpPr/>
-          <p:nvPr/>
-        </p:nvSpPr>
-        <p:spPr>
-          <a:xfrm rot="16200000" flipH="1">
-            <a:off x="6260611" y="6401115"/>
-            <a:ext cx="818727" cy="95045"/>
-          </a:xfrm>
-          <a:prstGeom prst="rect">
-            <a:avLst/>
-          </a:prstGeom>
-          <a:solidFill>
-            <a:srgbClr val="DB4437"/>
-          </a:solidFill>
-          <a:ln>
-            <a:solidFill>
-              <a:srgbClr val="DB4437"/>
-            </a:solidFill>
-          </a:ln>
-        </p:spPr>
-        <p:style>
-          <a:lnRef idx="2">
-            <a:schemeClr val="accent1">
-              <a:shade val="15000"/>
-            </a:schemeClr>
-          </a:lnRef>
-          <a:fillRef idx="1">
-            <a:schemeClr val="accent1"/>
-          </a:fillRef>
-          <a:effectRef idx="0">
-            <a:schemeClr val="accent1"/>
-          </a:effectRef>
-          <a:fontRef idx="minor">
-            <a:schemeClr val="lt1"/>
-          </a:fontRef>
-        </p:style>
-        <p:txBody>
-          <a:bodyPr rtlCol="0" anchor="ctr"/>
-          <a:lstStyle/>
-          <a:p>
-            <a:pPr algn="ctr"/>
-            <a:endParaRPr lang="en-US"/>
-          </a:p>
-        </p:txBody>
-      </p:sp>
-    </p:spTree>
-    <p:extLst>
-      <p:ext uri="{BB962C8B-B14F-4D97-AF65-F5344CB8AC3E}">
-        <p14:creationId xmlns:p14="http://schemas.microsoft.com/office/powerpoint/2010/main" val="1478046698"/>
-      </p:ext>
-    </p:extLst>
-  </p:cSld>
-  <p:clrMapOvr>
-    <a:masterClrMapping/>
-  </p:clrMapOvr>
-</p:sld>
-</file>
-
-<file path=ppt/slides/slide4.xml><?xml version="1.0" encoding="utf-8"?>
-<p:sld xmlns:a="http://schemas.openxmlformats.org/drawingml/2006/main" xmlns:r="http://schemas.openxmlformats.org/officeDocument/2006/relationships" xmlns:p="http://schemas.openxmlformats.org/presentationml/2006/main">
-  <p:cSld>
-    <p:spTree>
-      <p:nvGrpSpPr>
-        <p:cNvPr id="1" name=""/>
-        <p:cNvGrpSpPr/>
-        <p:nvPr/>
-      </p:nvGrpSpPr>
-      <p:grpSpPr>
-        <a:xfrm>
-          <a:off x="0" y="0"/>
-          <a:ext cx="0" cy="0"/>
-          <a:chOff x="0" y="0"/>
-          <a:chExt cx="0" cy="0"/>
-        </a:xfrm>
-      </p:grpSpPr>
-      <p:sp>
-        <p:nvSpPr>
-          <p:cNvPr id="15" name="Oval 14">
-            <a:extLst>
-              <a:ext uri="{FF2B5EF4-FFF2-40B4-BE49-F238E27FC236}">
-                <a16:creationId xmlns:a16="http://schemas.microsoft.com/office/drawing/2014/main" id="{1DCF9F32-0615-6321-D9E6-F926F2B99E7B}"/>
-              </a:ext>
-            </a:extLst>
-          </p:cNvPr>
-          <p:cNvSpPr/>
-          <p:nvPr/>
-        </p:nvSpPr>
-        <p:spPr>
-          <a:xfrm>
-            <a:off x="6095999" y="4843652"/>
-            <a:ext cx="1135609" cy="1135609"/>
-          </a:xfrm>
-          <a:prstGeom prst="ellipse">
-            <a:avLst/>
-          </a:prstGeom>
-          <a:solidFill>
-            <a:srgbClr val="DB4437"/>
-          </a:solidFill>
-          <a:ln w="12700">
-            <a:solidFill>
-              <a:schemeClr val="tx1"/>
-            </a:solidFill>
-          </a:ln>
-        </p:spPr>
-        <p:style>
-          <a:lnRef idx="2">
-            <a:schemeClr val="accent1">
-              <a:shade val="15000"/>
-            </a:schemeClr>
-          </a:lnRef>
-          <a:fillRef idx="1">
-            <a:schemeClr val="accent1"/>
-          </a:fillRef>
-          <a:effectRef idx="0">
-            <a:schemeClr val="accent1"/>
-          </a:effectRef>
-          <a:fontRef idx="minor">
-            <a:schemeClr val="lt1"/>
-          </a:fontRef>
-        </p:style>
-        <p:txBody>
-          <a:bodyPr rtlCol="0" anchor="ctr"/>
-          <a:lstStyle/>
-          <a:p>
-            <a:pPr algn="ctr"/>
-            <a:endParaRPr lang="en-US"/>
-          </a:p>
-        </p:txBody>
-      </p:sp>
-      <p:sp>
-        <p:nvSpPr>
-          <p:cNvPr id="13" name="Oval 12">
-            <a:extLst>
-              <a:ext uri="{FF2B5EF4-FFF2-40B4-BE49-F238E27FC236}">
-                <a16:creationId xmlns:a16="http://schemas.microsoft.com/office/drawing/2014/main" id="{DDA29669-145A-3558-3E6F-943DD255E5D1}"/>
-              </a:ext>
-            </a:extLst>
-          </p:cNvPr>
-          <p:cNvSpPr/>
-          <p:nvPr/>
-        </p:nvSpPr>
-        <p:spPr>
-          <a:xfrm>
-            <a:off x="6096000" y="2841129"/>
-            <a:ext cx="1135609" cy="1135609"/>
-          </a:xfrm>
-          <a:prstGeom prst="ellipse">
-            <a:avLst/>
-          </a:prstGeom>
-          <a:solidFill>
-            <a:srgbClr val="DB4437"/>
-          </a:solidFill>
-          <a:ln w="12700">
-            <a:solidFill>
-              <a:schemeClr val="tx1"/>
-            </a:solidFill>
-          </a:ln>
-        </p:spPr>
-        <p:style>
-          <a:lnRef idx="2">
-            <a:schemeClr val="accent1">
-              <a:shade val="15000"/>
-            </a:schemeClr>
-          </a:lnRef>
-          <a:fillRef idx="1">
-            <a:schemeClr val="accent1"/>
-          </a:fillRef>
-          <a:effectRef idx="0">
-            <a:schemeClr val="accent1"/>
-          </a:effectRef>
-          <a:fontRef idx="minor">
-            <a:schemeClr val="lt1"/>
-          </a:fontRef>
-        </p:style>
-        <p:txBody>
-          <a:bodyPr rtlCol="0" anchor="ctr"/>
-          <a:lstStyle/>
-          <a:p>
-            <a:pPr algn="ctr"/>
-            <a:endParaRPr lang="en-US"/>
-          </a:p>
-        </p:txBody>
-      </p:sp>
-      <p:sp>
-        <p:nvSpPr>
-          <p:cNvPr id="11" name="Oval 10">
-            <a:extLst>
-              <a:ext uri="{FF2B5EF4-FFF2-40B4-BE49-F238E27FC236}">
-                <a16:creationId xmlns:a16="http://schemas.microsoft.com/office/drawing/2014/main" id="{237E964B-20F9-A9EA-8882-BEBDBFBC427B}"/>
-              </a:ext>
-            </a:extLst>
-          </p:cNvPr>
-          <p:cNvSpPr/>
-          <p:nvPr/>
-        </p:nvSpPr>
-        <p:spPr>
-          <a:xfrm>
-            <a:off x="6096000" y="852557"/>
-            <a:ext cx="1135609" cy="1135609"/>
-          </a:xfrm>
-          <a:prstGeom prst="ellipse">
-            <a:avLst/>
-          </a:prstGeom>
-          <a:solidFill>
-            <a:srgbClr val="DB4437"/>
-          </a:solidFill>
-          <a:ln w="12700">
-            <a:solidFill>
-              <a:schemeClr val="tx1"/>
-            </a:solidFill>
-          </a:ln>
-        </p:spPr>
-        <p:style>
-          <a:lnRef idx="2">
-            <a:schemeClr val="accent1">
-              <a:shade val="15000"/>
-            </a:schemeClr>
-          </a:lnRef>
-          <a:fillRef idx="1">
-            <a:schemeClr val="accent1"/>
-          </a:fillRef>
-          <a:effectRef idx="0">
-            <a:schemeClr val="accent1"/>
-          </a:effectRef>
-          <a:fontRef idx="minor">
-            <a:schemeClr val="lt1"/>
-          </a:fontRef>
-        </p:style>
-        <p:txBody>
-          <a:bodyPr rtlCol="0" anchor="ctr"/>
-          <a:lstStyle/>
-          <a:p>
-            <a:pPr algn="ctr"/>
-            <a:endParaRPr lang="en-US"/>
-          </a:p>
-        </p:txBody>
-      </p:sp>
-      <p:sp>
-        <p:nvSpPr>
-          <p:cNvPr id="5" name="Title 1">
-            <a:extLst>
-              <a:ext uri="{FF2B5EF4-FFF2-40B4-BE49-F238E27FC236}">
-                <a16:creationId xmlns:a16="http://schemas.microsoft.com/office/drawing/2014/main" id="{04B84D17-BAAC-ADA2-4844-1DBC666F0FD1}"/>
-              </a:ext>
-            </a:extLst>
-          </p:cNvPr>
-          <p:cNvSpPr txBox="1">
-            <a:spLocks/>
-          </p:cNvSpPr>
-          <p:nvPr/>
-        </p:nvSpPr>
-        <p:spPr>
-          <a:xfrm>
-            <a:off x="7787297" y="1031076"/>
-            <a:ext cx="2929139" cy="793668"/>
+            <a:off x="8492230" y="5172897"/>
+            <a:ext cx="2929139" cy="649267"/>
           </a:xfrm>
           <a:prstGeom prst="rect">
             <a:avLst/>
@@ -5741,197 +4427,162 @@
             </a:lvl1pPr>
           </a:lstStyle>
           <a:p>
-            <a:pPr algn="l"/>
-            <a:r>
-              <a:rPr lang="en-US" sz="2400" dirty="0">
+            <a:r>
+              <a:rPr lang="en-US" sz="3600" dirty="0">
+                <a:solidFill>
+                  <a:schemeClr val="bg1">
+                    <a:lumMod val="75000"/>
+                  </a:schemeClr>
+                </a:solidFill>
                 <a:latin typeface="Poppins Medium" panose="00000600000000000000" pitchFamily="2" charset="0"/>
                 <a:cs typeface="Poppins Medium" panose="00000600000000000000" pitchFamily="2" charset="0"/>
               </a:rPr>
-              <a:t>Introduction</a:t>
-            </a:r>
-          </a:p>
-        </p:txBody>
-      </p:sp>
-      <p:sp>
-        <p:nvSpPr>
-          <p:cNvPr id="8" name="Title 1">
-            <a:extLst>
-              <a:ext uri="{FF2B5EF4-FFF2-40B4-BE49-F238E27FC236}">
-                <a16:creationId xmlns:a16="http://schemas.microsoft.com/office/drawing/2014/main" id="{9A71E735-7D51-CA31-9B13-51D2CCBBED3D}"/>
-              </a:ext>
-            </a:extLst>
-          </p:cNvPr>
-          <p:cNvSpPr txBox="1">
-            <a:spLocks/>
-          </p:cNvSpPr>
+              <a:t>03.</a:t>
+            </a:r>
+          </a:p>
+        </p:txBody>
+      </p:sp>
+      <p:grpSp>
+        <p:nvGrpSpPr>
+          <p:cNvPr id="23" name="Group 22">
+            <a:extLst>
+              <a:ext uri="{FF2B5EF4-FFF2-40B4-BE49-F238E27FC236}">
+                <a16:creationId xmlns:a16="http://schemas.microsoft.com/office/drawing/2014/main" id="{9A26D04F-1028-E859-AF60-178AE6777E0F}"/>
+              </a:ext>
+            </a:extLst>
+          </p:cNvPr>
+          <p:cNvGrpSpPr/>
           <p:nvPr/>
-        </p:nvSpPr>
-        <p:spPr>
+        </p:nvGrpSpPr>
+        <p:grpSpPr>
           <a:xfrm>
-            <a:off x="7787296" y="3049432"/>
-            <a:ext cx="2929139" cy="742754"/>
+            <a:off x="3848880" y="907148"/>
+            <a:ext cx="4494240" cy="807352"/>
+            <a:chOff x="3848880" y="1028998"/>
+            <a:chExt cx="4494240" cy="807352"/>
           </a:xfrm>
-          <a:prstGeom prst="rect">
-            <a:avLst/>
-          </a:prstGeom>
-        </p:spPr>
-        <p:txBody>
-          <a:bodyPr vert="horz" lIns="91440" tIns="45720" rIns="91440" bIns="45720" rtlCol="0" anchor="ctr">
-            <a:normAutofit/>
-          </a:bodyPr>
-          <a:lstStyle>
-            <a:lvl1pPr algn="ctr" defTabSz="914400" rtl="0" eaLnBrk="1" latinLnBrk="0" hangingPunct="1">
-              <a:lnSpc>
-                <a:spcPct val="90000"/>
-              </a:lnSpc>
-              <a:spcBef>
-                <a:spcPct val="0"/>
-              </a:spcBef>
-              <a:buNone/>
-              <a:defRPr sz="6000" kern="1200">
-                <a:solidFill>
-                  <a:schemeClr val="tx1"/>
-                </a:solidFill>
-                <a:latin typeface="+mj-lt"/>
-                <a:ea typeface="+mj-ea"/>
-                <a:cs typeface="+mj-cs"/>
-              </a:defRPr>
-            </a:lvl1pPr>
-          </a:lstStyle>
-          <a:p>
-            <a:pPr algn="l"/>
-            <a:r>
-              <a:rPr lang="en-US" sz="2400" dirty="0">
-                <a:latin typeface="Poppins Medium" panose="00000600000000000000" pitchFamily="2" charset="0"/>
-                <a:cs typeface="Poppins Medium" panose="00000600000000000000" pitchFamily="2" charset="0"/>
-              </a:rPr>
-              <a:t>Use Case</a:t>
-            </a:r>
-          </a:p>
-        </p:txBody>
-      </p:sp>
-      <p:sp>
-        <p:nvSpPr>
-          <p:cNvPr id="10" name="Title 1">
-            <a:extLst>
-              <a:ext uri="{FF2B5EF4-FFF2-40B4-BE49-F238E27FC236}">
-                <a16:creationId xmlns:a16="http://schemas.microsoft.com/office/drawing/2014/main" id="{E126F713-CEAA-09B1-CEF6-A5C8D8BAB0C6}"/>
-              </a:ext>
-            </a:extLst>
-          </p:cNvPr>
-          <p:cNvSpPr txBox="1">
-            <a:spLocks/>
-          </p:cNvSpPr>
-          <p:nvPr/>
-        </p:nvSpPr>
-        <p:spPr>
-          <a:xfrm>
-            <a:off x="7787298" y="5036122"/>
-            <a:ext cx="2929139" cy="750670"/>
-          </a:xfrm>
-          <a:prstGeom prst="rect">
-            <a:avLst/>
-          </a:prstGeom>
-        </p:spPr>
-        <p:txBody>
-          <a:bodyPr vert="horz" lIns="91440" tIns="45720" rIns="91440" bIns="45720" rtlCol="0" anchor="ctr">
-            <a:normAutofit/>
-          </a:bodyPr>
-          <a:lstStyle>
-            <a:lvl1pPr algn="ctr" defTabSz="914400" rtl="0" eaLnBrk="1" latinLnBrk="0" hangingPunct="1">
-              <a:lnSpc>
-                <a:spcPct val="90000"/>
-              </a:lnSpc>
-              <a:spcBef>
-                <a:spcPct val="0"/>
-              </a:spcBef>
-              <a:buNone/>
-              <a:defRPr sz="6000" kern="1200">
-                <a:solidFill>
-                  <a:schemeClr val="tx1"/>
-                </a:solidFill>
-                <a:latin typeface="+mj-lt"/>
-                <a:ea typeface="+mj-ea"/>
-                <a:cs typeface="+mj-cs"/>
-              </a:defRPr>
-            </a:lvl1pPr>
-          </a:lstStyle>
-          <a:p>
-            <a:pPr algn="l"/>
-            <a:r>
-              <a:rPr lang="en-US" sz="2400" dirty="0">
-                <a:latin typeface="Poppins Medium" panose="00000600000000000000" pitchFamily="2" charset="0"/>
-                <a:cs typeface="Poppins Medium" panose="00000600000000000000" pitchFamily="2" charset="0"/>
-              </a:rPr>
-              <a:t>Case Study</a:t>
-            </a:r>
-          </a:p>
-        </p:txBody>
-      </p:sp>
-      <p:sp>
-        <p:nvSpPr>
-          <p:cNvPr id="12" name="Title 1">
-            <a:extLst>
-              <a:ext uri="{FF2B5EF4-FFF2-40B4-BE49-F238E27FC236}">
-                <a16:creationId xmlns:a16="http://schemas.microsoft.com/office/drawing/2014/main" id="{8A2E8E83-5D9B-B0FA-6522-2202C6218135}"/>
-              </a:ext>
-            </a:extLst>
-          </p:cNvPr>
-          <p:cNvSpPr txBox="1">
-            <a:spLocks/>
-          </p:cNvSpPr>
-          <p:nvPr/>
-        </p:nvSpPr>
-        <p:spPr>
-          <a:xfrm>
-            <a:off x="1097585" y="2630606"/>
-            <a:ext cx="2990496" cy="1596788"/>
-          </a:xfrm>
-          <a:prstGeom prst="rect">
-            <a:avLst/>
-          </a:prstGeom>
-        </p:spPr>
-        <p:txBody>
-          <a:bodyPr vert="horz" lIns="91440" tIns="45720" rIns="91440" bIns="45720" rtlCol="0" anchor="ctr">
-            <a:normAutofit/>
-          </a:bodyPr>
-          <a:lstStyle>
-            <a:lvl1pPr algn="ctr" defTabSz="914400" rtl="0" eaLnBrk="1" latinLnBrk="0" hangingPunct="1">
-              <a:lnSpc>
-                <a:spcPct val="90000"/>
-              </a:lnSpc>
-              <a:spcBef>
-                <a:spcPct val="0"/>
-              </a:spcBef>
-              <a:buNone/>
-              <a:defRPr sz="6000" kern="1200">
-                <a:solidFill>
-                  <a:schemeClr val="tx1"/>
-                </a:solidFill>
-                <a:latin typeface="+mj-lt"/>
-                <a:ea typeface="+mj-ea"/>
-                <a:cs typeface="+mj-cs"/>
-              </a:defRPr>
-            </a:lvl1pPr>
-          </a:lstStyle>
-          <a:p>
-            <a:pPr algn="l"/>
-            <a:r>
-              <a:rPr lang="en-US" sz="4800" dirty="0">
-                <a:latin typeface="Poppins Medium" panose="00000600000000000000" pitchFamily="2" charset="0"/>
-                <a:cs typeface="Poppins Medium" panose="00000600000000000000" pitchFamily="2" charset="0"/>
-              </a:rPr>
-              <a:t>Table of Contents</a:t>
-            </a:r>
-          </a:p>
-        </p:txBody>
-      </p:sp>
+        </p:grpSpPr>
+        <p:sp>
+          <p:nvSpPr>
+            <p:cNvPr id="12" name="Title 1">
+              <a:extLst>
+                <a:ext uri="{FF2B5EF4-FFF2-40B4-BE49-F238E27FC236}">
+                  <a16:creationId xmlns:a16="http://schemas.microsoft.com/office/drawing/2014/main" id="{8A2E8E83-5D9B-B0FA-6522-2202C6218135}"/>
+                </a:ext>
+              </a:extLst>
+            </p:cNvPr>
+            <p:cNvSpPr txBox="1">
+              <a:spLocks/>
+            </p:cNvSpPr>
+            <p:nvPr/>
+          </p:nvSpPr>
+          <p:spPr>
+            <a:xfrm>
+              <a:off x="3848880" y="1028998"/>
+              <a:ext cx="4494240" cy="724736"/>
+            </a:xfrm>
+            <a:prstGeom prst="rect">
+              <a:avLst/>
+            </a:prstGeom>
+          </p:spPr>
+          <p:txBody>
+            <a:bodyPr vert="horz" lIns="91440" tIns="45720" rIns="91440" bIns="45720" rtlCol="0" anchor="ctr">
+              <a:normAutofit/>
+            </a:bodyPr>
+            <a:lstStyle>
+              <a:lvl1pPr algn="ctr" defTabSz="914400" rtl="0" eaLnBrk="1" latinLnBrk="0" hangingPunct="1">
+                <a:lnSpc>
+                  <a:spcPct val="90000"/>
+                </a:lnSpc>
+                <a:spcBef>
+                  <a:spcPct val="0"/>
+                </a:spcBef>
+                <a:buNone/>
+                <a:defRPr sz="6000" kern="1200">
+                  <a:solidFill>
+                    <a:schemeClr val="tx1"/>
+                  </a:solidFill>
+                  <a:latin typeface="+mj-lt"/>
+                  <a:ea typeface="+mj-ea"/>
+                  <a:cs typeface="+mj-cs"/>
+                </a:defRPr>
+              </a:lvl1pPr>
+            </a:lstStyle>
+            <a:p>
+              <a:r>
+                <a:rPr lang="en-US" sz="3600" dirty="0">
+                  <a:solidFill>
+                    <a:schemeClr val="bg1"/>
+                  </a:solidFill>
+                  <a:latin typeface="Poppins Medium" panose="00000600000000000000" pitchFamily="2" charset="0"/>
+                  <a:cs typeface="Poppins Medium" panose="00000600000000000000" pitchFamily="2" charset="0"/>
+                </a:rPr>
+                <a:t>Table of Contents</a:t>
+              </a:r>
+            </a:p>
+          </p:txBody>
+        </p:sp>
+        <p:sp>
+          <p:nvSpPr>
+            <p:cNvPr id="22" name="Rectangle 21">
+              <a:extLst>
+                <a:ext uri="{FF2B5EF4-FFF2-40B4-BE49-F238E27FC236}">
+                  <a16:creationId xmlns:a16="http://schemas.microsoft.com/office/drawing/2014/main" id="{27E55455-0B70-0F9C-6DF5-6926E46D15F3}"/>
+                </a:ext>
+              </a:extLst>
+            </p:cNvPr>
+            <p:cNvSpPr/>
+            <p:nvPr/>
+          </p:nvSpPr>
+          <p:spPr>
+            <a:xfrm rot="16200000" flipH="1">
+              <a:off x="6054692" y="60087"/>
+              <a:ext cx="82616" cy="3469910"/>
+            </a:xfrm>
+            <a:prstGeom prst="rect">
+              <a:avLst/>
+            </a:prstGeom>
+            <a:solidFill>
+              <a:schemeClr val="bg1"/>
+            </a:solidFill>
+            <a:ln>
+              <a:solidFill>
+                <a:schemeClr val="tx1"/>
+              </a:solidFill>
+            </a:ln>
+          </p:spPr>
+          <p:style>
+            <a:lnRef idx="2">
+              <a:schemeClr val="accent1">
+                <a:shade val="15000"/>
+              </a:schemeClr>
+            </a:lnRef>
+            <a:fillRef idx="1">
+              <a:schemeClr val="accent1"/>
+            </a:fillRef>
+            <a:effectRef idx="0">
+              <a:schemeClr val="accent1"/>
+            </a:effectRef>
+            <a:fontRef idx="minor">
+              <a:schemeClr val="lt1"/>
+            </a:fontRef>
+          </p:style>
+          <p:txBody>
+            <a:bodyPr rtlCol="0" anchor="ctr"/>
+            <a:lstStyle/>
+            <a:p>
+              <a:pPr algn="ctr"/>
+              <a:endParaRPr lang="en-US"/>
+            </a:p>
+          </p:txBody>
+        </p:sp>
+      </p:grpSp>
       <p:pic>
         <p:nvPicPr>
-          <p:cNvPr id="14" name="Graphic 13" descr="Lights On with solid fill">
-            <a:extLst>
-              <a:ext uri="{FF2B5EF4-FFF2-40B4-BE49-F238E27FC236}">
-                <a16:creationId xmlns:a16="http://schemas.microsoft.com/office/drawing/2014/main" id="{42C7C49D-1E61-EF8F-9D8D-95563035FF6A}"/>
+          <p:cNvPr id="24" name="Graphic 23" descr="Clipboard with solid fill">
+            <a:extLst>
+              <a:ext uri="{FF2B5EF4-FFF2-40B4-BE49-F238E27FC236}">
+                <a16:creationId xmlns:a16="http://schemas.microsoft.com/office/drawing/2014/main" id="{528C2B10-AF4E-4E05-7E10-F399BF55E15D}"/>
               </a:ext>
             </a:extLst>
           </p:cNvPr>
@@ -5941,13 +4592,13 @@
           <p:nvPr/>
         </p:nvPicPr>
         <p:blipFill>
-          <a:blip r:embed="rId2">
+          <a:blip r:embed="rId7">
             <a:extLst>
               <a:ext uri="{28A0092B-C50C-407E-A947-70E740481C1C}">
                 <a14:useLocalDpi xmlns:a14="http://schemas.microsoft.com/office/drawing/2010/main" val="0"/>
               </a:ext>
               <a:ext uri="{96DAC541-7B7A-43D3-8B79-37D633B846F1}">
-                <asvg:svgBlip xmlns:asvg="http://schemas.microsoft.com/office/drawing/2016/SVG/main" r:embed="rId3"/>
+                <asvg:svgBlip xmlns:asvg="http://schemas.microsoft.com/office/drawing/2016/SVG/main" r:embed="rId8"/>
               </a:ext>
             </a:extLst>
           </a:blip>
@@ -5957,86 +4608,8 @@
         </p:blipFill>
         <p:spPr>
           <a:xfrm>
-            <a:off x="6273140" y="1031076"/>
-            <a:ext cx="793668" cy="793668"/>
-          </a:xfrm>
-          <a:prstGeom prst="rect">
-            <a:avLst/>
-          </a:prstGeom>
-        </p:spPr>
-      </p:pic>
-      <p:pic>
-        <p:nvPicPr>
-          <p:cNvPr id="16" name="Graphic 15" descr="Bullseye with solid fill">
-            <a:extLst>
-              <a:ext uri="{FF2B5EF4-FFF2-40B4-BE49-F238E27FC236}">
-                <a16:creationId xmlns:a16="http://schemas.microsoft.com/office/drawing/2014/main" id="{812E2CD3-219E-38D5-24F7-D2D765F2A364}"/>
-              </a:ext>
-            </a:extLst>
-          </p:cNvPr>
-          <p:cNvPicPr>
-            <a:picLocks noChangeAspect="1"/>
-          </p:cNvPicPr>
-          <p:nvPr/>
-        </p:nvPicPr>
-        <p:blipFill>
-          <a:blip r:embed="rId4">
-            <a:extLst>
-              <a:ext uri="{28A0092B-C50C-407E-A947-70E740481C1C}">
-                <a14:useLocalDpi xmlns:a14="http://schemas.microsoft.com/office/drawing/2010/main" val="0"/>
-              </a:ext>
-              <a:ext uri="{96DAC541-7B7A-43D3-8B79-37D633B846F1}">
-                <asvg:svgBlip xmlns:asvg="http://schemas.microsoft.com/office/drawing/2016/SVG/main" r:embed="rId5"/>
-              </a:ext>
-            </a:extLst>
-          </a:blip>
-          <a:stretch>
-            <a:fillRect/>
-          </a:stretch>
-        </p:blipFill>
-        <p:spPr>
-          <a:xfrm>
-            <a:off x="6266969" y="3023975"/>
-            <a:ext cx="793668" cy="793668"/>
-          </a:xfrm>
-          <a:prstGeom prst="rect">
-            <a:avLst/>
-          </a:prstGeom>
-        </p:spPr>
-      </p:pic>
-      <p:pic>
-        <p:nvPicPr>
-          <p:cNvPr id="18" name="Graphic 17" descr="Clipboard with solid fill">
-            <a:extLst>
-              <a:ext uri="{FF2B5EF4-FFF2-40B4-BE49-F238E27FC236}">
-                <a16:creationId xmlns:a16="http://schemas.microsoft.com/office/drawing/2014/main" id="{A3C48E83-2B28-B7BC-2369-9850479D9A69}"/>
-              </a:ext>
-            </a:extLst>
-          </p:cNvPr>
-          <p:cNvPicPr>
-            <a:picLocks noChangeAspect="1"/>
-          </p:cNvPicPr>
-          <p:nvPr/>
-        </p:nvPicPr>
-        <p:blipFill>
-          <a:blip r:embed="rId6">
-            <a:extLst>
-              <a:ext uri="{28A0092B-C50C-407E-A947-70E740481C1C}">
-                <a14:useLocalDpi xmlns:a14="http://schemas.microsoft.com/office/drawing/2010/main" val="0"/>
-              </a:ext>
-              <a:ext uri="{96DAC541-7B7A-43D3-8B79-37D633B846F1}">
-                <asvg:svgBlip xmlns:asvg="http://schemas.microsoft.com/office/drawing/2016/SVG/main" r:embed="rId7"/>
-              </a:ext>
-            </a:extLst>
-          </a:blip>
-          <a:stretch>
-            <a:fillRect/>
-          </a:stretch>
-        </p:blipFill>
-        <p:spPr>
-          <a:xfrm>
-            <a:off x="6266969" y="5014622"/>
-            <a:ext cx="793668" cy="793668"/>
+            <a:off x="9531090" y="2937624"/>
+            <a:ext cx="924668" cy="924668"/>
           </a:xfrm>
           <a:prstGeom prst="rect">
             <a:avLst/>
@@ -6046,7 +4619,7 @@
     </p:spTree>
     <p:extLst>
       <p:ext uri="{BB962C8B-B14F-4D97-AF65-F5344CB8AC3E}">
-        <p14:creationId xmlns:p14="http://schemas.microsoft.com/office/powerpoint/2010/main" val="3328520842"/>
+        <p14:creationId xmlns:p14="http://schemas.microsoft.com/office/powerpoint/2010/main" val="798681217"/>
       </p:ext>
     </p:extLst>
   </p:cSld>
@@ -6056,548 +4629,7 @@
 </p:sld>
 </file>
 
-<file path=ppt/slides/slide5.xml><?xml version="1.0" encoding="utf-8"?>
-<p:sld xmlns:a="http://schemas.openxmlformats.org/drawingml/2006/main" xmlns:r="http://schemas.openxmlformats.org/officeDocument/2006/relationships" xmlns:p="http://schemas.openxmlformats.org/presentationml/2006/main">
-  <p:cSld>
-    <p:spTree>
-      <p:nvGrpSpPr>
-        <p:cNvPr id="1" name=""/>
-        <p:cNvGrpSpPr/>
-        <p:nvPr/>
-      </p:nvGrpSpPr>
-      <p:grpSpPr>
-        <a:xfrm>
-          <a:off x="0" y="0"/>
-          <a:ext cx="0" cy="0"/>
-          <a:chOff x="0" y="0"/>
-          <a:chExt cx="0" cy="0"/>
-        </a:xfrm>
-      </p:grpSpPr>
-      <p:sp>
-        <p:nvSpPr>
-          <p:cNvPr id="2" name="Oval 1">
-            <a:extLst>
-              <a:ext uri="{FF2B5EF4-FFF2-40B4-BE49-F238E27FC236}">
-                <a16:creationId xmlns:a16="http://schemas.microsoft.com/office/drawing/2014/main" id="{3B3FAE1A-4066-246F-10BC-6EC9B1267984}"/>
-              </a:ext>
-            </a:extLst>
-          </p:cNvPr>
-          <p:cNvSpPr/>
-          <p:nvPr/>
-        </p:nvSpPr>
-        <p:spPr>
-          <a:xfrm>
-            <a:off x="6096000" y="4869834"/>
-            <a:ext cx="1135609" cy="1135609"/>
-          </a:xfrm>
-          <a:prstGeom prst="ellipse">
-            <a:avLst/>
-          </a:prstGeom>
-          <a:solidFill>
-            <a:schemeClr val="bg1"/>
-          </a:solidFill>
-          <a:ln w="38100">
-            <a:solidFill>
-              <a:srgbClr val="DB4437"/>
-            </a:solidFill>
-          </a:ln>
-        </p:spPr>
-        <p:style>
-          <a:lnRef idx="2">
-            <a:schemeClr val="accent1">
-              <a:shade val="15000"/>
-            </a:schemeClr>
-          </a:lnRef>
-          <a:fillRef idx="1">
-            <a:schemeClr val="accent1"/>
-          </a:fillRef>
-          <a:effectRef idx="0">
-            <a:schemeClr val="accent1"/>
-          </a:effectRef>
-          <a:fontRef idx="minor">
-            <a:schemeClr val="lt1"/>
-          </a:fontRef>
-        </p:style>
-        <p:txBody>
-          <a:bodyPr rtlCol="0" anchor="ctr"/>
-          <a:lstStyle/>
-          <a:p>
-            <a:pPr algn="ctr"/>
-            <a:endParaRPr lang="en-US"/>
-          </a:p>
-        </p:txBody>
-      </p:sp>
-      <p:sp>
-        <p:nvSpPr>
-          <p:cNvPr id="13" name="Oval 12">
-            <a:extLst>
-              <a:ext uri="{FF2B5EF4-FFF2-40B4-BE49-F238E27FC236}">
-                <a16:creationId xmlns:a16="http://schemas.microsoft.com/office/drawing/2014/main" id="{DDA29669-145A-3558-3E6F-943DD255E5D1}"/>
-              </a:ext>
-            </a:extLst>
-          </p:cNvPr>
-          <p:cNvSpPr/>
-          <p:nvPr/>
-        </p:nvSpPr>
-        <p:spPr>
-          <a:xfrm>
-            <a:off x="6096000" y="2841129"/>
-            <a:ext cx="1135609" cy="1135609"/>
-          </a:xfrm>
-          <a:prstGeom prst="ellipse">
-            <a:avLst/>
-          </a:prstGeom>
-          <a:solidFill>
-            <a:srgbClr val="DB4437"/>
-          </a:solidFill>
-          <a:ln w="12700">
-            <a:solidFill>
-              <a:schemeClr val="tx1"/>
-            </a:solidFill>
-          </a:ln>
-        </p:spPr>
-        <p:style>
-          <a:lnRef idx="2">
-            <a:schemeClr val="accent1">
-              <a:shade val="15000"/>
-            </a:schemeClr>
-          </a:lnRef>
-          <a:fillRef idx="1">
-            <a:schemeClr val="accent1"/>
-          </a:fillRef>
-          <a:effectRef idx="0">
-            <a:schemeClr val="accent1"/>
-          </a:effectRef>
-          <a:fontRef idx="minor">
-            <a:schemeClr val="lt1"/>
-          </a:fontRef>
-        </p:style>
-        <p:txBody>
-          <a:bodyPr rtlCol="0" anchor="ctr"/>
-          <a:lstStyle/>
-          <a:p>
-            <a:pPr algn="ctr"/>
-            <a:endParaRPr lang="en-US"/>
-          </a:p>
-        </p:txBody>
-      </p:sp>
-      <p:sp>
-        <p:nvSpPr>
-          <p:cNvPr id="11" name="Oval 10">
-            <a:extLst>
-              <a:ext uri="{FF2B5EF4-FFF2-40B4-BE49-F238E27FC236}">
-                <a16:creationId xmlns:a16="http://schemas.microsoft.com/office/drawing/2014/main" id="{237E964B-20F9-A9EA-8882-BEBDBFBC427B}"/>
-              </a:ext>
-            </a:extLst>
-          </p:cNvPr>
-          <p:cNvSpPr/>
-          <p:nvPr/>
-        </p:nvSpPr>
-        <p:spPr>
-          <a:xfrm>
-            <a:off x="6096000" y="852557"/>
-            <a:ext cx="1135609" cy="1135609"/>
-          </a:xfrm>
-          <a:prstGeom prst="ellipse">
-            <a:avLst/>
-          </a:prstGeom>
-          <a:solidFill>
-            <a:schemeClr val="bg1"/>
-          </a:solidFill>
-          <a:ln w="38100">
-            <a:solidFill>
-              <a:srgbClr val="DB4437"/>
-            </a:solidFill>
-          </a:ln>
-        </p:spPr>
-        <p:style>
-          <a:lnRef idx="2">
-            <a:schemeClr val="accent1">
-              <a:shade val="15000"/>
-            </a:schemeClr>
-          </a:lnRef>
-          <a:fillRef idx="1">
-            <a:schemeClr val="accent1"/>
-          </a:fillRef>
-          <a:effectRef idx="0">
-            <a:schemeClr val="accent1"/>
-          </a:effectRef>
-          <a:fontRef idx="minor">
-            <a:schemeClr val="lt1"/>
-          </a:fontRef>
-        </p:style>
-        <p:txBody>
-          <a:bodyPr rtlCol="0" anchor="ctr"/>
-          <a:lstStyle/>
-          <a:p>
-            <a:pPr algn="ctr"/>
-            <a:endParaRPr lang="en-US"/>
-          </a:p>
-        </p:txBody>
-      </p:sp>
-      <p:sp>
-        <p:nvSpPr>
-          <p:cNvPr id="5" name="Title 1">
-            <a:extLst>
-              <a:ext uri="{FF2B5EF4-FFF2-40B4-BE49-F238E27FC236}">
-                <a16:creationId xmlns:a16="http://schemas.microsoft.com/office/drawing/2014/main" id="{04B84D17-BAAC-ADA2-4844-1DBC666F0FD1}"/>
-              </a:ext>
-            </a:extLst>
-          </p:cNvPr>
-          <p:cNvSpPr txBox="1">
-            <a:spLocks/>
-          </p:cNvSpPr>
-          <p:nvPr/>
-        </p:nvSpPr>
-        <p:spPr>
-          <a:xfrm>
-            <a:off x="7787297" y="1031076"/>
-            <a:ext cx="2929139" cy="793668"/>
-          </a:xfrm>
-          <a:prstGeom prst="rect">
-            <a:avLst/>
-          </a:prstGeom>
-        </p:spPr>
-        <p:txBody>
-          <a:bodyPr vert="horz" lIns="91440" tIns="45720" rIns="91440" bIns="45720" rtlCol="0" anchor="ctr">
-            <a:normAutofit/>
-          </a:bodyPr>
-          <a:lstStyle>
-            <a:lvl1pPr algn="ctr" defTabSz="914400" rtl="0" eaLnBrk="1" latinLnBrk="0" hangingPunct="1">
-              <a:lnSpc>
-                <a:spcPct val="90000"/>
-              </a:lnSpc>
-              <a:spcBef>
-                <a:spcPct val="0"/>
-              </a:spcBef>
-              <a:buNone/>
-              <a:defRPr sz="6000" kern="1200">
-                <a:solidFill>
-                  <a:schemeClr val="tx1"/>
-                </a:solidFill>
-                <a:latin typeface="+mj-lt"/>
-                <a:ea typeface="+mj-ea"/>
-                <a:cs typeface="+mj-cs"/>
-              </a:defRPr>
-            </a:lvl1pPr>
-          </a:lstStyle>
-          <a:p>
-            <a:pPr algn="l"/>
-            <a:r>
-              <a:rPr lang="en-US" sz="2400" dirty="0">
-                <a:latin typeface="Poppins Medium" panose="00000600000000000000" pitchFamily="2" charset="0"/>
-                <a:cs typeface="Poppins Medium" panose="00000600000000000000" pitchFamily="2" charset="0"/>
-              </a:rPr>
-              <a:t>Introduction</a:t>
-            </a:r>
-          </a:p>
-        </p:txBody>
-      </p:sp>
-      <p:sp>
-        <p:nvSpPr>
-          <p:cNvPr id="8" name="Title 1">
-            <a:extLst>
-              <a:ext uri="{FF2B5EF4-FFF2-40B4-BE49-F238E27FC236}">
-                <a16:creationId xmlns:a16="http://schemas.microsoft.com/office/drawing/2014/main" id="{9A71E735-7D51-CA31-9B13-51D2CCBBED3D}"/>
-              </a:ext>
-            </a:extLst>
-          </p:cNvPr>
-          <p:cNvSpPr txBox="1">
-            <a:spLocks/>
-          </p:cNvSpPr>
-          <p:nvPr/>
-        </p:nvSpPr>
-        <p:spPr>
-          <a:xfrm>
-            <a:off x="7787296" y="3049432"/>
-            <a:ext cx="2929139" cy="742754"/>
-          </a:xfrm>
-          <a:prstGeom prst="rect">
-            <a:avLst/>
-          </a:prstGeom>
-        </p:spPr>
-        <p:txBody>
-          <a:bodyPr vert="horz" lIns="91440" tIns="45720" rIns="91440" bIns="45720" rtlCol="0" anchor="ctr">
-            <a:normAutofit/>
-          </a:bodyPr>
-          <a:lstStyle>
-            <a:lvl1pPr algn="ctr" defTabSz="914400" rtl="0" eaLnBrk="1" latinLnBrk="0" hangingPunct="1">
-              <a:lnSpc>
-                <a:spcPct val="90000"/>
-              </a:lnSpc>
-              <a:spcBef>
-                <a:spcPct val="0"/>
-              </a:spcBef>
-              <a:buNone/>
-              <a:defRPr sz="6000" kern="1200">
-                <a:solidFill>
-                  <a:schemeClr val="tx1"/>
-                </a:solidFill>
-                <a:latin typeface="+mj-lt"/>
-                <a:ea typeface="+mj-ea"/>
-                <a:cs typeface="+mj-cs"/>
-              </a:defRPr>
-            </a:lvl1pPr>
-          </a:lstStyle>
-          <a:p>
-            <a:pPr algn="l"/>
-            <a:r>
-              <a:rPr lang="en-US" sz="2400" dirty="0">
-                <a:latin typeface="Poppins Medium" panose="00000600000000000000" pitchFamily="2" charset="0"/>
-                <a:cs typeface="Poppins Medium" panose="00000600000000000000" pitchFamily="2" charset="0"/>
-              </a:rPr>
-              <a:t>Use Case</a:t>
-            </a:r>
-          </a:p>
-        </p:txBody>
-      </p:sp>
-      <p:sp>
-        <p:nvSpPr>
-          <p:cNvPr id="10" name="Title 1">
-            <a:extLst>
-              <a:ext uri="{FF2B5EF4-FFF2-40B4-BE49-F238E27FC236}">
-                <a16:creationId xmlns:a16="http://schemas.microsoft.com/office/drawing/2014/main" id="{E126F713-CEAA-09B1-CEF6-A5C8D8BAB0C6}"/>
-              </a:ext>
-            </a:extLst>
-          </p:cNvPr>
-          <p:cNvSpPr txBox="1">
-            <a:spLocks/>
-          </p:cNvSpPr>
-          <p:nvPr/>
-        </p:nvSpPr>
-        <p:spPr>
-          <a:xfrm>
-            <a:off x="7787298" y="5036122"/>
-            <a:ext cx="2929139" cy="750670"/>
-          </a:xfrm>
-          <a:prstGeom prst="rect">
-            <a:avLst/>
-          </a:prstGeom>
-        </p:spPr>
-        <p:txBody>
-          <a:bodyPr vert="horz" lIns="91440" tIns="45720" rIns="91440" bIns="45720" rtlCol="0" anchor="ctr">
-            <a:normAutofit/>
-          </a:bodyPr>
-          <a:lstStyle>
-            <a:lvl1pPr algn="ctr" defTabSz="914400" rtl="0" eaLnBrk="1" latinLnBrk="0" hangingPunct="1">
-              <a:lnSpc>
-                <a:spcPct val="90000"/>
-              </a:lnSpc>
-              <a:spcBef>
-                <a:spcPct val="0"/>
-              </a:spcBef>
-              <a:buNone/>
-              <a:defRPr sz="6000" kern="1200">
-                <a:solidFill>
-                  <a:schemeClr val="tx1"/>
-                </a:solidFill>
-                <a:latin typeface="+mj-lt"/>
-                <a:ea typeface="+mj-ea"/>
-                <a:cs typeface="+mj-cs"/>
-              </a:defRPr>
-            </a:lvl1pPr>
-          </a:lstStyle>
-          <a:p>
-            <a:pPr algn="l"/>
-            <a:r>
-              <a:rPr lang="en-US" sz="2400" dirty="0">
-                <a:latin typeface="Poppins Medium" panose="00000600000000000000" pitchFamily="2" charset="0"/>
-                <a:cs typeface="Poppins Medium" panose="00000600000000000000" pitchFamily="2" charset="0"/>
-              </a:rPr>
-              <a:t>Case Study</a:t>
-            </a:r>
-          </a:p>
-        </p:txBody>
-      </p:sp>
-      <p:sp>
-        <p:nvSpPr>
-          <p:cNvPr id="12" name="Title 1">
-            <a:extLst>
-              <a:ext uri="{FF2B5EF4-FFF2-40B4-BE49-F238E27FC236}">
-                <a16:creationId xmlns:a16="http://schemas.microsoft.com/office/drawing/2014/main" id="{8A2E8E83-5D9B-B0FA-6522-2202C6218135}"/>
-              </a:ext>
-            </a:extLst>
-          </p:cNvPr>
-          <p:cNvSpPr txBox="1">
-            <a:spLocks/>
-          </p:cNvSpPr>
-          <p:nvPr/>
-        </p:nvSpPr>
-        <p:spPr>
-          <a:xfrm>
-            <a:off x="1097585" y="2630606"/>
-            <a:ext cx="2990496" cy="1596788"/>
-          </a:xfrm>
-          <a:prstGeom prst="rect">
-            <a:avLst/>
-          </a:prstGeom>
-        </p:spPr>
-        <p:txBody>
-          <a:bodyPr vert="horz" lIns="91440" tIns="45720" rIns="91440" bIns="45720" rtlCol="0" anchor="ctr">
-            <a:normAutofit/>
-          </a:bodyPr>
-          <a:lstStyle>
-            <a:lvl1pPr algn="ctr" defTabSz="914400" rtl="0" eaLnBrk="1" latinLnBrk="0" hangingPunct="1">
-              <a:lnSpc>
-                <a:spcPct val="90000"/>
-              </a:lnSpc>
-              <a:spcBef>
-                <a:spcPct val="0"/>
-              </a:spcBef>
-              <a:buNone/>
-              <a:defRPr sz="6000" kern="1200">
-                <a:solidFill>
-                  <a:schemeClr val="tx1"/>
-                </a:solidFill>
-                <a:latin typeface="+mj-lt"/>
-                <a:ea typeface="+mj-ea"/>
-                <a:cs typeface="+mj-cs"/>
-              </a:defRPr>
-            </a:lvl1pPr>
-          </a:lstStyle>
-          <a:p>
-            <a:pPr algn="l"/>
-            <a:r>
-              <a:rPr lang="en-US" sz="4800" dirty="0">
-                <a:latin typeface="Poppins Medium" panose="00000600000000000000" pitchFamily="2" charset="0"/>
-                <a:cs typeface="Poppins Medium" panose="00000600000000000000" pitchFamily="2" charset="0"/>
-              </a:rPr>
-              <a:t>Table of Contents</a:t>
-            </a:r>
-          </a:p>
-        </p:txBody>
-      </p:sp>
-      <p:pic>
-        <p:nvPicPr>
-          <p:cNvPr id="14" name="Graphic 13" descr="Lights On with solid fill">
-            <a:extLst>
-              <a:ext uri="{FF2B5EF4-FFF2-40B4-BE49-F238E27FC236}">
-                <a16:creationId xmlns:a16="http://schemas.microsoft.com/office/drawing/2014/main" id="{42C7C49D-1E61-EF8F-9D8D-95563035FF6A}"/>
-              </a:ext>
-            </a:extLst>
-          </p:cNvPr>
-          <p:cNvPicPr>
-            <a:picLocks noChangeAspect="1"/>
-          </p:cNvPicPr>
-          <p:nvPr/>
-        </p:nvPicPr>
-        <p:blipFill>
-          <a:blip r:embed="rId2">
-            <a:extLst>
-              <a:ext uri="{28A0092B-C50C-407E-A947-70E740481C1C}">
-                <a14:useLocalDpi xmlns:a14="http://schemas.microsoft.com/office/drawing/2010/main" val="0"/>
-              </a:ext>
-              <a:ext uri="{96DAC541-7B7A-43D3-8B79-37D633B846F1}">
-                <asvg:svgBlip xmlns:asvg="http://schemas.microsoft.com/office/drawing/2016/SVG/main" r:embed="rId3"/>
-              </a:ext>
-            </a:extLst>
-          </a:blip>
-          <a:stretch>
-            <a:fillRect/>
-          </a:stretch>
-        </p:blipFill>
-        <p:spPr>
-          <a:xfrm>
-            <a:off x="6273140" y="1031076"/>
-            <a:ext cx="793668" cy="793668"/>
-          </a:xfrm>
-          <a:prstGeom prst="rect">
-            <a:avLst/>
-          </a:prstGeom>
-        </p:spPr>
-      </p:pic>
-      <p:pic>
-        <p:nvPicPr>
-          <p:cNvPr id="16" name="Graphic 15" descr="Bullseye with solid fill">
-            <a:extLst>
-              <a:ext uri="{FF2B5EF4-FFF2-40B4-BE49-F238E27FC236}">
-                <a16:creationId xmlns:a16="http://schemas.microsoft.com/office/drawing/2014/main" id="{812E2CD3-219E-38D5-24F7-D2D765F2A364}"/>
-              </a:ext>
-            </a:extLst>
-          </p:cNvPr>
-          <p:cNvPicPr>
-            <a:picLocks noChangeAspect="1"/>
-          </p:cNvPicPr>
-          <p:nvPr/>
-        </p:nvPicPr>
-        <p:blipFill>
-          <a:blip r:embed="rId4">
-            <a:extLst>
-              <a:ext uri="{28A0092B-C50C-407E-A947-70E740481C1C}">
-                <a14:useLocalDpi xmlns:a14="http://schemas.microsoft.com/office/drawing/2010/main" val="0"/>
-              </a:ext>
-              <a:ext uri="{96DAC541-7B7A-43D3-8B79-37D633B846F1}">
-                <asvg:svgBlip xmlns:asvg="http://schemas.microsoft.com/office/drawing/2016/SVG/main" r:embed="rId5"/>
-              </a:ext>
-            </a:extLst>
-          </a:blip>
-          <a:stretch>
-            <a:fillRect/>
-          </a:stretch>
-        </p:blipFill>
-        <p:spPr>
-          <a:xfrm>
-            <a:off x="6266969" y="3023975"/>
-            <a:ext cx="793668" cy="793668"/>
-          </a:xfrm>
-          <a:prstGeom prst="rect">
-            <a:avLst/>
-          </a:prstGeom>
-        </p:spPr>
-      </p:pic>
-      <p:pic>
-        <p:nvPicPr>
-          <p:cNvPr id="18" name="Graphic 17" descr="Clipboard with solid fill">
-            <a:extLst>
-              <a:ext uri="{FF2B5EF4-FFF2-40B4-BE49-F238E27FC236}">
-                <a16:creationId xmlns:a16="http://schemas.microsoft.com/office/drawing/2014/main" id="{A3C48E83-2B28-B7BC-2369-9850479D9A69}"/>
-              </a:ext>
-            </a:extLst>
-          </p:cNvPr>
-          <p:cNvPicPr>
-            <a:picLocks noChangeAspect="1"/>
-          </p:cNvPicPr>
-          <p:nvPr/>
-        </p:nvPicPr>
-        <p:blipFill>
-          <a:blip r:embed="rId6">
-            <a:extLst>
-              <a:ext uri="{28A0092B-C50C-407E-A947-70E740481C1C}">
-                <a14:useLocalDpi xmlns:a14="http://schemas.microsoft.com/office/drawing/2010/main" val="0"/>
-              </a:ext>
-              <a:ext uri="{96DAC541-7B7A-43D3-8B79-37D633B846F1}">
-                <asvg:svgBlip xmlns:asvg="http://schemas.microsoft.com/office/drawing/2016/SVG/main" r:embed="rId7"/>
-              </a:ext>
-            </a:extLst>
-          </a:blip>
-          <a:stretch>
-            <a:fillRect/>
-          </a:stretch>
-        </p:blipFill>
-        <p:spPr>
-          <a:xfrm>
-            <a:off x="6266969" y="5014622"/>
-            <a:ext cx="793668" cy="793668"/>
-          </a:xfrm>
-          <a:prstGeom prst="rect">
-            <a:avLst/>
-          </a:prstGeom>
-        </p:spPr>
-      </p:pic>
-    </p:spTree>
-    <p:extLst>
-      <p:ext uri="{BB962C8B-B14F-4D97-AF65-F5344CB8AC3E}">
-        <p14:creationId xmlns:p14="http://schemas.microsoft.com/office/powerpoint/2010/main" val="101877782"/>
-      </p:ext>
-    </p:extLst>
-  </p:cSld>
-  <p:clrMapOvr>
-    <a:masterClrMapping/>
-  </p:clrMapOvr>
-</p:sld>
-</file>
-
-<file path=ppt/slides/slide6.xml><?xml version="1.0" encoding="utf-8"?>
+<file path=ppt/slides/slide3.xml><?xml version="1.0" encoding="utf-8"?>
 <p:sld xmlns:a="http://schemas.openxmlformats.org/drawingml/2006/main" xmlns:r="http://schemas.openxmlformats.org/officeDocument/2006/relationships" xmlns:p="http://schemas.openxmlformats.org/presentationml/2006/main">
   <p:cSld>
     <p:spTree>

</xml_diff>